<commit_message>
Minor fixes on classes and objects advanced
</commit_message>
<xml_diff>
--- a/Courses/Software-Sciences/Module-1-OOP/07.2-Classes-and-Objects-Advanced/07.2-Classes-and-Objects-Advanced.pptx
+++ b/Courses/Software-Sciences/Module-1-OOP/07.2-Classes-and-Objects-Advanced/07.2-Classes-and-Objects-Advanced.pptx
@@ -244,7 +244,7 @@
             </a:lvl1pPr>
           </a:lstStyle>
           <a:p>
-            <a:endParaRPr lang="bg-BG"/>
+            <a:endParaRPr lang="bg-BG" dirty="0"/>
           </a:p>
         </p:txBody>
       </p:sp>
@@ -283,9 +283,9 @@
           <a:p>
             <a:fld id="{4E087215-0C8F-4762-A664-737A353EC9A4}" type="datetimeFigureOut">
               <a:rPr lang="bg-BG" smtClean="0"/>
-              <a:t>23.01.23 г.</a:t>
+              <a:t>17.05.23 г.</a:t>
             </a:fld>
-            <a:endParaRPr lang="bg-BG"/>
+            <a:endParaRPr lang="bg-BG" dirty="0"/>
           </a:p>
         </p:txBody>
       </p:sp>
@@ -323,17 +323,17 @@
           </a:lstStyle>
           <a:p>
             <a:r>
-              <a:rPr lang="en-US" sz="1100"/>
+              <a:rPr lang="en-US" sz="1100" dirty="0"/>
               <a:t>© SoftUni – </a:t>
             </a:r>
             <a:r>
-              <a:rPr lang="en-US" sz="1100" u="sng">
+              <a:rPr lang="en-US" sz="1100" u="sng" dirty="0">
                 <a:hlinkClick r:id="rId2"/>
               </a:rPr>
               <a:t>https://softuni.org</a:t>
             </a:r>
             <a:r>
-              <a:rPr lang="en-US" sz="1100"/>
+              <a:rPr lang="en-US" sz="1100" dirty="0"/>
               <a:t>. Copyrighted document. Unauthorized copy or reproduction is not permitted.</a:t>
             </a:r>
           </a:p>
@@ -376,7 +376,7 @@
               <a:rPr lang="bg-BG" smtClean="0"/>
               <a:t>‹#›</a:t>
             </a:fld>
-            <a:endParaRPr lang="bg-BG"/>
+            <a:endParaRPr lang="bg-BG" dirty="0"/>
           </a:p>
         </p:txBody>
       </p:sp>
@@ -441,7 +441,7 @@
             </a:lvl1pPr>
           </a:lstStyle>
           <a:p>
-            <a:endParaRPr lang="en-US"/>
+            <a:endParaRPr lang="en-US" dirty="0"/>
           </a:p>
         </p:txBody>
       </p:sp>
@@ -474,9 +474,9 @@
           <a:p>
             <a:fld id="{72D84649-876A-46C9-8472-14CB09C070D8}" type="datetimeFigureOut">
               <a:rPr lang="en-US" smtClean="0"/>
-              <a:t>1/23/23</a:t>
+              <a:t>5/17/23</a:t>
             </a:fld>
-            <a:endParaRPr lang="en-US"/>
+            <a:endParaRPr lang="en-US" dirty="0"/>
           </a:p>
         </p:txBody>
       </p:sp>
@@ -509,7 +509,7 @@
           <a:bodyPr vert="horz" lIns="91440" tIns="45720" rIns="91440" bIns="45720" rtlCol="0" anchor="ctr"/>
           <a:lstStyle/>
           <a:p>
-            <a:endParaRPr lang="en-US"/>
+            <a:endParaRPr lang="en-US" dirty="0"/>
           </a:p>
         </p:txBody>
       </p:sp>
@@ -603,7 +603,7 @@
               <a:rPr lang="en-US" smtClean="0"/>
               <a:t>‹#›</a:t>
             </a:fld>
-            <a:endParaRPr lang="en-US"/>
+            <a:endParaRPr lang="en-US" dirty="0"/>
           </a:p>
         </p:txBody>
       </p:sp>
@@ -641,17 +641,17 @@
           </a:lstStyle>
           <a:p>
             <a:r>
-              <a:rPr lang="en-US"/>
+              <a:rPr lang="en-US" dirty="0"/>
               <a:t>© SoftUni – </a:t>
             </a:r>
             <a:r>
-              <a:rPr lang="en-US" u="sng">
+              <a:rPr lang="en-US" u="sng" dirty="0">
                 <a:hlinkClick r:id="rId2"/>
               </a:rPr>
               <a:t>https://softuni.org</a:t>
             </a:r>
             <a:r>
-              <a:rPr lang="en-US"/>
+              <a:rPr lang="en-US" dirty="0"/>
               <a:t>. Copyrighted document. Unauthorized copy or reproduction is not permitted.</a:t>
             </a:r>
           </a:p>
@@ -805,7 +805,7 @@
           <a:bodyPr/>
           <a:lstStyle/>
           <a:p>
-            <a:endParaRPr lang="en-US"/>
+            <a:endParaRPr lang="en-US" dirty="0"/>
           </a:p>
         </p:txBody>
       </p:sp>
@@ -829,7 +829,7 @@
               <a:pPr/>
               <a:t>1</a:t>
             </a:fld>
-            <a:endParaRPr lang="en-US"/>
+            <a:endParaRPr lang="en-US" dirty="0"/>
           </a:p>
         </p:txBody>
       </p:sp>
@@ -867,17 +867,17 @@
           </a:lstStyle>
           <a:p>
             <a:r>
-              <a:rPr lang="en-US"/>
+              <a:rPr lang="en-US" dirty="0"/>
               <a:t>© SoftUni – </a:t>
             </a:r>
             <a:r>
-              <a:rPr lang="en-US" u="sng">
+              <a:rPr lang="en-US" u="sng" dirty="0">
                 <a:hlinkClick r:id="rId3"/>
               </a:rPr>
               <a:t>https://softuni.org</a:t>
             </a:r>
             <a:r>
-              <a:rPr lang="en-US"/>
+              <a:rPr lang="en-US" dirty="0"/>
               <a:t>. Copyrighted document. Unauthorized copy or reproduction is not permitted.</a:t>
             </a:r>
           </a:p>
@@ -1002,15 +1002,7 @@
           <a:p>
             <a:r>
               <a:rPr lang="en-US" dirty="0"/>
-              <a:t>© </a:t>
-            </a:r>
-            <a:r>
-              <a:rPr lang="en-US" dirty="0" err="1"/>
-              <a:t>SoftUni</a:t>
-            </a:r>
-            <a:r>
-              <a:rPr lang="en-US" dirty="0"/>
-              <a:t> – </a:t>
+              <a:t>© SoftUni – </a:t>
             </a:r>
             <a:r>
               <a:rPr lang="en-US" u="sng" dirty="0">
@@ -1082,7 +1074,7 @@
           <a:bodyPr/>
           <a:lstStyle/>
           <a:p>
-            <a:endParaRPr lang="bg-BG"/>
+            <a:endParaRPr lang="bg-BG" dirty="0"/>
           </a:p>
         </p:txBody>
       </p:sp>
@@ -1105,7 +1097,7 @@
               <a:rPr lang="en-US" smtClean="0"/>
               <a:t>13</a:t>
             </a:fld>
-            <a:endParaRPr lang="en-US"/>
+            <a:endParaRPr lang="en-US" dirty="0"/>
           </a:p>
         </p:txBody>
       </p:sp>
@@ -1143,17 +1135,17 @@
           </a:lstStyle>
           <a:p>
             <a:r>
-              <a:rPr lang="en-US"/>
+              <a:rPr lang="en-US" dirty="0"/>
               <a:t>© SoftUni – </a:t>
             </a:r>
             <a:r>
-              <a:rPr lang="en-US" u="sng">
+              <a:rPr lang="en-US" u="sng" dirty="0">
                 <a:hlinkClick r:id="rId3"/>
               </a:rPr>
               <a:t>https://softuni.org</a:t>
             </a:r>
             <a:r>
-              <a:rPr lang="en-US"/>
+              <a:rPr lang="en-US" dirty="0"/>
               <a:t>. Copyrighted document. Unauthorized copy or reproduction is not permitted.</a:t>
             </a:r>
           </a:p>
@@ -1216,7 +1208,7 @@
           <a:bodyPr/>
           <a:lstStyle/>
           <a:p>
-            <a:endParaRPr lang="en-US"/>
+            <a:endParaRPr lang="en-US" dirty="0"/>
           </a:p>
         </p:txBody>
       </p:sp>
@@ -1240,7 +1232,7 @@
               <a:pPr/>
               <a:t>15</a:t>
             </a:fld>
-            <a:endParaRPr lang="en-US"/>
+            <a:endParaRPr lang="en-US" dirty="0"/>
           </a:p>
         </p:txBody>
       </p:sp>
@@ -1278,17 +1270,17 @@
           </a:lstStyle>
           <a:p>
             <a:r>
-              <a:rPr lang="en-US"/>
+              <a:rPr lang="en-US" dirty="0"/>
               <a:t>© SoftUni – </a:t>
             </a:r>
             <a:r>
-              <a:rPr lang="en-US" u="sng">
+              <a:rPr lang="en-US" u="sng" dirty="0">
                 <a:hlinkClick r:id="rId3"/>
               </a:rPr>
               <a:t>https://softuni.org</a:t>
             </a:r>
             <a:r>
-              <a:rPr lang="en-US"/>
+              <a:rPr lang="en-US" dirty="0"/>
               <a:t>. Copyrighted document. Unauthorized copy or reproduction is not permitted.</a:t>
             </a:r>
           </a:p>
@@ -1351,7 +1343,7 @@
           <a:bodyPr/>
           <a:lstStyle/>
           <a:p>
-            <a:endParaRPr lang="en-US"/>
+            <a:endParaRPr lang="en-US" dirty="0"/>
           </a:p>
         </p:txBody>
       </p:sp>
@@ -1481,7 +1473,7 @@
               <a:pPr/>
               <a:t>16</a:t>
             </a:fld>
-            <a:endParaRPr lang="en-US"/>
+            <a:endParaRPr lang="en-US" dirty="0"/>
           </a:p>
         </p:txBody>
       </p:sp>
@@ -1519,17 +1511,17 @@
           </a:lstStyle>
           <a:p>
             <a:r>
-              <a:rPr lang="en-US"/>
+              <a:rPr lang="en-US" dirty="0"/>
               <a:t>© SoftUni – </a:t>
             </a:r>
             <a:r>
-              <a:rPr lang="en-US" u="sng">
+              <a:rPr lang="en-US" u="sng" dirty="0">
                 <a:hlinkClick r:id="rId3"/>
               </a:rPr>
               <a:t>https://softuni.org</a:t>
             </a:r>
             <a:r>
-              <a:rPr lang="en-US"/>
+              <a:rPr lang="en-US" dirty="0"/>
               <a:t>. Copyrighted document. Unauthorized copy or reproduction is not permitted.</a:t>
             </a:r>
           </a:p>
@@ -1592,7 +1584,7 @@
           <a:bodyPr/>
           <a:lstStyle/>
           <a:p>
-            <a:endParaRPr lang="en-US"/>
+            <a:endParaRPr lang="en-US" dirty="0"/>
           </a:p>
         </p:txBody>
       </p:sp>
@@ -1722,7 +1714,7 @@
               <a:pPr/>
               <a:t>17</a:t>
             </a:fld>
-            <a:endParaRPr lang="en-US"/>
+            <a:endParaRPr lang="en-US" dirty="0"/>
           </a:p>
         </p:txBody>
       </p:sp>
@@ -1760,17 +1752,17 @@
           </a:lstStyle>
           <a:p>
             <a:r>
-              <a:rPr lang="en-US"/>
+              <a:rPr lang="en-US" dirty="0"/>
               <a:t>© SoftUni – </a:t>
             </a:r>
             <a:r>
-              <a:rPr lang="en-US" u="sng">
+              <a:rPr lang="en-US" u="sng" dirty="0">
                 <a:hlinkClick r:id="rId3"/>
               </a:rPr>
               <a:t>https://softuni.org</a:t>
             </a:r>
             <a:r>
-              <a:rPr lang="en-US"/>
+              <a:rPr lang="en-US" dirty="0"/>
               <a:t>. Copyrighted document. Unauthorized copy or reproduction is not permitted.</a:t>
             </a:r>
           </a:p>
@@ -1856,7 +1848,7 @@
               <a:rPr lang="en-US" smtClean="0"/>
               <a:t>2</a:t>
             </a:fld>
-            <a:endParaRPr lang="en-US"/>
+            <a:endParaRPr lang="en-US" dirty="0"/>
           </a:p>
         </p:txBody>
       </p:sp>
@@ -1876,17 +1868,17 @@
           <a:lstStyle/>
           <a:p>
             <a:r>
-              <a:rPr lang="en-US"/>
+              <a:rPr lang="en-US" dirty="0"/>
               <a:t>© SoftUni – </a:t>
             </a:r>
             <a:r>
-              <a:rPr lang="en-US" u="sng">
+              <a:rPr lang="en-US" u="sng" dirty="0">
                 <a:hlinkClick r:id="rId3"/>
               </a:rPr>
               <a:t>https://softuni.org</a:t>
             </a:r>
             <a:r>
-              <a:rPr lang="en-US"/>
+              <a:rPr lang="en-US" dirty="0"/>
               <a:t>. Copyrighted document. Unauthorized copy or reproduction is not permitted.</a:t>
             </a:r>
           </a:p>
@@ -1972,7 +1964,7 @@
               <a:rPr lang="en-US" smtClean="0"/>
               <a:t>3</a:t>
             </a:fld>
-            <a:endParaRPr lang="en-US"/>
+            <a:endParaRPr lang="en-US" dirty="0"/>
           </a:p>
         </p:txBody>
       </p:sp>
@@ -1992,17 +1984,17 @@
           <a:lstStyle/>
           <a:p>
             <a:r>
-              <a:rPr lang="en-US"/>
+              <a:rPr lang="en-US" dirty="0"/>
               <a:t>© SoftUni – </a:t>
             </a:r>
             <a:r>
-              <a:rPr lang="en-US" u="sng">
+              <a:rPr lang="en-US" u="sng" dirty="0">
                 <a:hlinkClick r:id="rId3"/>
               </a:rPr>
               <a:t>https://softuni.org</a:t>
             </a:r>
             <a:r>
-              <a:rPr lang="en-US"/>
+              <a:rPr lang="en-US" dirty="0"/>
               <a:t>. Copyrighted document. Unauthorized copy or reproduction is not permitted.</a:t>
             </a:r>
           </a:p>
@@ -2065,7 +2057,7 @@
           <a:bodyPr/>
           <a:lstStyle/>
           <a:p>
-            <a:endParaRPr lang="en-US"/>
+            <a:endParaRPr lang="en-US" dirty="0"/>
           </a:p>
         </p:txBody>
       </p:sp>
@@ -2089,7 +2081,7 @@
               <a:pPr/>
               <a:t>6</a:t>
             </a:fld>
-            <a:endParaRPr lang="en-US"/>
+            <a:endParaRPr lang="en-US" dirty="0"/>
           </a:p>
         </p:txBody>
       </p:sp>
@@ -2127,17 +2119,17 @@
           </a:lstStyle>
           <a:p>
             <a:r>
-              <a:rPr lang="en-US"/>
+              <a:rPr lang="en-US" dirty="0"/>
               <a:t>© SoftUni – </a:t>
             </a:r>
             <a:r>
-              <a:rPr lang="en-US" u="sng">
+              <a:rPr lang="en-US" u="sng" dirty="0">
                 <a:hlinkClick r:id="rId3"/>
               </a:rPr>
               <a:t>https://softuni.org</a:t>
             </a:r>
             <a:r>
-              <a:rPr lang="en-US"/>
+              <a:rPr lang="en-US" dirty="0"/>
               <a:t>. Copyrighted document. Unauthorized copy or reproduction is not permitted.</a:t>
             </a:r>
           </a:p>
@@ -2200,7 +2192,7 @@
           <a:bodyPr/>
           <a:lstStyle/>
           <a:p>
-            <a:endParaRPr lang="en-GB"/>
+            <a:endParaRPr lang="en-GB" dirty="0"/>
           </a:p>
         </p:txBody>
       </p:sp>
@@ -2224,7 +2216,7 @@
               <a:pPr/>
               <a:t>7</a:t>
             </a:fld>
-            <a:endParaRPr lang="en-US"/>
+            <a:endParaRPr lang="en-US" dirty="0"/>
           </a:p>
         </p:txBody>
       </p:sp>
@@ -2262,17 +2254,17 @@
           </a:lstStyle>
           <a:p>
             <a:r>
-              <a:rPr lang="en-US"/>
+              <a:rPr lang="en-US" dirty="0"/>
               <a:t>© SoftUni – </a:t>
             </a:r>
             <a:r>
-              <a:rPr lang="en-US" u="sng">
+              <a:rPr lang="en-US" u="sng" dirty="0">
                 <a:hlinkClick r:id="rId3"/>
               </a:rPr>
               <a:t>https://softuni.org</a:t>
             </a:r>
             <a:r>
-              <a:rPr lang="en-US"/>
+              <a:rPr lang="en-US" dirty="0"/>
               <a:t>. Copyrighted document. Unauthorized copy or reproduction is not permitted.</a:t>
             </a:r>
           </a:p>
@@ -2335,7 +2327,7 @@
           <a:bodyPr/>
           <a:lstStyle/>
           <a:p>
-            <a:endParaRPr lang="en-GB"/>
+            <a:endParaRPr lang="en-GB" dirty="0"/>
           </a:p>
         </p:txBody>
       </p:sp>
@@ -2359,7 +2351,7 @@
               <a:pPr/>
               <a:t>8</a:t>
             </a:fld>
-            <a:endParaRPr lang="en-US"/>
+            <a:endParaRPr lang="en-US" dirty="0"/>
           </a:p>
         </p:txBody>
       </p:sp>
@@ -2397,17 +2389,17 @@
           </a:lstStyle>
           <a:p>
             <a:r>
-              <a:rPr lang="en-US"/>
+              <a:rPr lang="en-US" dirty="0"/>
               <a:t>© SoftUni – </a:t>
             </a:r>
             <a:r>
-              <a:rPr lang="en-US" u="sng">
+              <a:rPr lang="en-US" u="sng" dirty="0">
                 <a:hlinkClick r:id="rId3"/>
               </a:rPr>
               <a:t>https://softuni.org</a:t>
             </a:r>
             <a:r>
-              <a:rPr lang="en-US"/>
+              <a:rPr lang="en-US" dirty="0"/>
               <a:t>. Copyrighted document. Unauthorized copy or reproduction is not permitted.</a:t>
             </a:r>
           </a:p>
@@ -2493,7 +2485,7 @@
               <a:rPr lang="en-US" smtClean="0"/>
               <a:t>9</a:t>
             </a:fld>
-            <a:endParaRPr lang="en-US"/>
+            <a:endParaRPr lang="en-US" dirty="0"/>
           </a:p>
         </p:txBody>
       </p:sp>
@@ -2513,17 +2505,17 @@
           <a:lstStyle/>
           <a:p>
             <a:r>
-              <a:rPr lang="en-US"/>
+              <a:rPr lang="en-US" dirty="0"/>
               <a:t>© SoftUni – </a:t>
             </a:r>
             <a:r>
-              <a:rPr lang="en-US" u="sng">
+              <a:rPr lang="en-US" u="sng" dirty="0">
                 <a:hlinkClick r:id="rId3"/>
               </a:rPr>
               <a:t>https://softuni.org</a:t>
             </a:r>
             <a:r>
-              <a:rPr lang="en-US"/>
+              <a:rPr lang="en-US" dirty="0"/>
               <a:t>. Copyrighted document. Unauthorized copy or reproduction is not permitted.</a:t>
             </a:r>
           </a:p>
@@ -2586,7 +2578,7 @@
           <a:bodyPr/>
           <a:lstStyle/>
           <a:p>
-            <a:endParaRPr lang="bg-BG"/>
+            <a:endParaRPr lang="bg-BG" dirty="0"/>
           </a:p>
         </p:txBody>
       </p:sp>
@@ -2609,7 +2601,7 @@
               <a:rPr lang="en-US" smtClean="0"/>
               <a:t>10</a:t>
             </a:fld>
-            <a:endParaRPr lang="en-US"/>
+            <a:endParaRPr lang="en-US" dirty="0"/>
           </a:p>
         </p:txBody>
       </p:sp>
@@ -2647,17 +2639,17 @@
           </a:lstStyle>
           <a:p>
             <a:r>
-              <a:rPr lang="en-US"/>
+              <a:rPr lang="en-US" dirty="0"/>
               <a:t>© SoftUni – </a:t>
             </a:r>
             <a:r>
-              <a:rPr lang="en-US" u="sng">
+              <a:rPr lang="en-US" u="sng" dirty="0">
                 <a:hlinkClick r:id="rId3"/>
               </a:rPr>
               <a:t>https://softuni.org</a:t>
             </a:r>
             <a:r>
-              <a:rPr lang="en-US"/>
+              <a:rPr lang="en-US" dirty="0"/>
               <a:t>. Copyrighted document. Unauthorized copy or reproduction is not permitted.</a:t>
             </a:r>
           </a:p>
@@ -2743,7 +2735,7 @@
               <a:rPr lang="en-US" smtClean="0"/>
               <a:t>11</a:t>
             </a:fld>
-            <a:endParaRPr lang="en-US"/>
+            <a:endParaRPr lang="en-US" dirty="0"/>
           </a:p>
         </p:txBody>
       </p:sp>
@@ -2763,17 +2755,17 @@
           <a:lstStyle/>
           <a:p>
             <a:r>
-              <a:rPr lang="en-US"/>
+              <a:rPr lang="en-US" dirty="0"/>
               <a:t>© SoftUni – </a:t>
             </a:r>
             <a:r>
-              <a:rPr lang="en-US" u="sng">
+              <a:rPr lang="en-US" u="sng" dirty="0">
                 <a:hlinkClick r:id="rId3"/>
               </a:rPr>
               <a:t>https://softuni.org</a:t>
             </a:r>
             <a:r>
-              <a:rPr lang="en-US"/>
+              <a:rPr lang="en-US" dirty="0"/>
               <a:t>. Copyrighted document. Unauthorized copy or reproduction is not permitted.</a:t>
             </a:r>
           </a:p>
@@ -2873,7 +2865,7 @@
               <a:tabLst/>
               <a:defRPr/>
             </a:pPr>
-            <a:endParaRPr kumimoji="0" lang="en-US" altLang="ko-KR" sz="2398" b="0" i="0" u="none" strike="noStrike" kern="1200" cap="none" spc="0" normalizeH="0" baseline="0" noProof="0">
+            <a:endParaRPr kumimoji="0" lang="en-US" altLang="ko-KR" sz="2398" b="0" i="0" u="none" strike="noStrike" kern="1200" cap="none" spc="0" normalizeH="0" baseline="0" noProof="0" dirty="0">
               <a:ln>
                 <a:noFill/>
               </a:ln>
@@ -3298,7 +3290,7 @@
           </a:lstStyle>
           <a:p>
             <a:r>
-              <a:rPr lang="en-US" noProof="0"/>
+              <a:rPr lang="en-US" noProof="0" dirty="0"/>
               <a:t>Click icon to add picture</a:t>
             </a:r>
           </a:p>
@@ -3502,7 +3494,7 @@
               <a:tabLst/>
               <a:defRPr/>
             </a:pPr>
-            <a:endParaRPr kumimoji="0" lang="en-US" altLang="ko-KR" sz="2398" b="0" i="0" u="none" strike="noStrike" kern="1200" cap="none" spc="0" normalizeH="0" baseline="0" noProof="0">
+            <a:endParaRPr kumimoji="0" lang="en-US" altLang="ko-KR" sz="2398" b="0" i="0" u="none" strike="noStrike" kern="1200" cap="none" spc="0" normalizeH="0" baseline="0" noProof="0" dirty="0">
               <a:ln>
                 <a:noFill/>
               </a:ln>
@@ -3561,7 +3553,7 @@
               <a:pPr/>
               <a:t>‹#›</a:t>
             </a:fld>
-            <a:endParaRPr lang="en-US"/>
+            <a:endParaRPr lang="en-US" dirty="0"/>
           </a:p>
         </p:txBody>
       </p:sp>
@@ -3625,7 +3617,7 @@
               <a:tabLst/>
               <a:defRPr/>
             </a:pPr>
-            <a:endParaRPr kumimoji="0" lang="en-US" altLang="ko-KR" sz="2398" b="0" i="0" u="none" strike="noStrike" kern="1200" cap="none" spc="0" normalizeH="0" baseline="0" noProof="0">
+            <a:endParaRPr kumimoji="0" lang="en-US" altLang="ko-KR" sz="2398" b="0" i="0" u="none" strike="noStrike" kern="1200" cap="none" spc="0" normalizeH="0" baseline="0" noProof="0" dirty="0">
               <a:ln>
                 <a:noFill/>
               </a:ln>
@@ -3898,7 +3890,7 @@
               <a:tabLst/>
               <a:defRPr/>
             </a:pPr>
-            <a:endParaRPr kumimoji="0" lang="en-US" altLang="ko-KR" sz="2398" b="0" i="0" u="none" strike="noStrike" kern="1200" cap="none" spc="0" normalizeH="0" baseline="0" noProof="0">
+            <a:endParaRPr kumimoji="0" lang="en-US" altLang="ko-KR" sz="2398" b="0" i="0" u="none" strike="noStrike" kern="1200" cap="none" spc="0" normalizeH="0" baseline="0" noProof="0" dirty="0">
               <a:ln>
                 <a:noFill/>
               </a:ln>
@@ -4084,7 +4076,7 @@
               <a:pPr/>
               <a:t>‹#›</a:t>
             </a:fld>
-            <a:endParaRPr lang="en-US" noProof="0"/>
+            <a:endParaRPr lang="en-US" noProof="0" dirty="0"/>
           </a:p>
         </p:txBody>
       </p:sp>
@@ -4238,7 +4230,7 @@
           </a:lstStyle>
           <a:p>
             <a:r>
-              <a:rPr lang="en-US" altLang="ko-KR" noProof="0"/>
+              <a:rPr lang="en-US" altLang="ko-KR" noProof="0" dirty="0"/>
               <a:t>Your Picture Here</a:t>
             </a:r>
           </a:p>
@@ -4302,7 +4294,7 @@
               <a:tabLst/>
               <a:defRPr/>
             </a:pPr>
-            <a:endParaRPr kumimoji="0" lang="en-US" altLang="ko-KR" sz="2398" b="0" i="0" u="none" strike="noStrike" kern="1200" cap="none" spc="0" normalizeH="0" baseline="0" noProof="0">
+            <a:endParaRPr kumimoji="0" lang="en-US" altLang="ko-KR" sz="2398" b="0" i="0" u="none" strike="noStrike" kern="1200" cap="none" spc="0" normalizeH="0" baseline="0" noProof="0" dirty="0">
               <a:ln>
                 <a:noFill/>
               </a:ln>
@@ -4377,7 +4369,7 @@
               <a:tabLst/>
               <a:defRPr/>
             </a:pPr>
-            <a:endParaRPr kumimoji="0" lang="en-US" altLang="ko-KR" sz="2398" b="0" i="0" u="none" strike="noStrike" kern="1200" cap="none" spc="0" normalizeH="0" baseline="0" noProof="0">
+            <a:endParaRPr kumimoji="0" lang="en-US" altLang="ko-KR" sz="2398" b="0" i="0" u="none" strike="noStrike" kern="1200" cap="none" spc="0" normalizeH="0" baseline="0" noProof="0" dirty="0">
               <a:ln>
                 <a:noFill/>
               </a:ln>
@@ -4458,7 +4450,7 @@
               <a:tabLst/>
               <a:defRPr/>
             </a:pPr>
-            <a:endParaRPr kumimoji="0" lang="en-US" altLang="ko-KR" sz="2398" b="0" i="0" u="none" strike="noStrike" kern="1200" cap="none" spc="0" normalizeH="0" baseline="0" noProof="0">
+            <a:endParaRPr kumimoji="0" lang="en-US" altLang="ko-KR" sz="2398" b="0" i="0" u="none" strike="noStrike" kern="1200" cap="none" spc="0" normalizeH="0" baseline="0" noProof="0" dirty="0">
               <a:ln>
                 <a:noFill/>
               </a:ln>
@@ -4539,7 +4531,7 @@
               <a:tabLst/>
               <a:defRPr/>
             </a:pPr>
-            <a:endParaRPr kumimoji="0" lang="en-US" altLang="ko-KR" sz="2398" b="0" i="0" u="none" strike="noStrike" kern="1200" cap="none" spc="0" normalizeH="0" baseline="0" noProof="0">
+            <a:endParaRPr kumimoji="0" lang="en-US" altLang="ko-KR" sz="2398" b="0" i="0" u="none" strike="noStrike" kern="1200" cap="none" spc="0" normalizeH="0" baseline="0" noProof="0" dirty="0">
               <a:ln>
                 <a:noFill/>
               </a:ln>
@@ -4743,7 +4735,7 @@
               <a:tabLst/>
               <a:defRPr/>
             </a:pPr>
-            <a:endParaRPr kumimoji="0" lang="en-US" altLang="ko-KR" sz="2398" b="0" i="0" u="none" strike="noStrike" kern="1200" cap="none" spc="0" normalizeH="0" baseline="0" noProof="0">
+            <a:endParaRPr kumimoji="0" lang="en-US" altLang="ko-KR" sz="2398" b="0" i="0" u="none" strike="noStrike" kern="1200" cap="none" spc="0" normalizeH="0" baseline="0" noProof="0" dirty="0">
               <a:ln>
                 <a:noFill/>
               </a:ln>
@@ -4799,7 +4791,7 @@
               </a:spcAft>
             </a:pPr>
             <a:r>
-              <a:rPr lang="en-US" sz="1600" noProof="0">
+              <a:rPr lang="en-US" sz="1600" noProof="0" dirty="0">
                 <a:solidFill>
                   <a:schemeClr val="bg2"/>
                 </a:solidFill>
@@ -4811,7 +4803,7 @@
               <a:t>© SoftUni – </a:t>
             </a:r>
             <a:r>
-              <a:rPr lang="en-US" sz="1600" u="sng" noProof="0">
+              <a:rPr lang="en-US" sz="1600" u="sng" noProof="0" dirty="0">
                 <a:solidFill>
                   <a:schemeClr val="bg2"/>
                 </a:solidFill>
@@ -4830,7 +4822,7 @@
               <a:t>https://softuni.org</a:t>
             </a:r>
             <a:r>
-              <a:rPr lang="en-US" sz="1600" noProof="0">
+              <a:rPr lang="en-US" sz="1600" noProof="0" dirty="0">
                 <a:solidFill>
                   <a:schemeClr val="bg2"/>
                 </a:solidFill>
@@ -4841,7 +4833,7 @@
               </a:rPr>
               <a:t>. Copyrighted document. Unauthorized copy, reproduction or use is not permitted.</a:t>
             </a:r>
-            <a:endParaRPr lang="en-US" sz="2400" noProof="0">
+            <a:endParaRPr lang="en-US" sz="2400" noProof="0" dirty="0">
               <a:solidFill>
                 <a:schemeClr val="bg2"/>
               </a:solidFill>
@@ -5705,7 +5697,7 @@
               <a:pPr/>
               <a:t>‹#›</a:t>
             </a:fld>
-            <a:endParaRPr lang="en-US" noProof="0"/>
+            <a:endParaRPr lang="en-US" noProof="0" dirty="0"/>
           </a:p>
         </p:txBody>
       </p:sp>
@@ -6057,7 +6049,7 @@
               <a:tabLst/>
               <a:defRPr/>
             </a:pPr>
-            <a:endParaRPr kumimoji="0" lang="en-US" altLang="ko-KR" sz="2398" b="0" i="0" u="none" strike="noStrike" kern="1200" cap="none" spc="0" normalizeH="0" baseline="0" noProof="0">
+            <a:endParaRPr kumimoji="0" lang="en-US" altLang="ko-KR" sz="2398" b="0" i="0" u="none" strike="noStrike" kern="1200" cap="none" spc="0" normalizeH="0" baseline="0" noProof="0" dirty="0">
               <a:ln>
                 <a:noFill/>
               </a:ln>
@@ -6249,7 +6241,7 @@
               <a:tabLst/>
               <a:defRPr/>
             </a:pPr>
-            <a:endParaRPr kumimoji="0" lang="en-US" altLang="ko-KR" sz="2398" b="0" i="0" u="none" strike="noStrike" kern="1200" cap="none" spc="0" normalizeH="0" baseline="0" noProof="0">
+            <a:endParaRPr kumimoji="0" lang="en-US" altLang="ko-KR" sz="2398" b="0" i="0" u="none" strike="noStrike" kern="1200" cap="none" spc="0" normalizeH="0" baseline="0" noProof="0" dirty="0">
               <a:ln>
                 <a:noFill/>
               </a:ln>
@@ -6431,7 +6423,7 @@
               <a:pPr/>
               <a:t>‹#›</a:t>
             </a:fld>
-            <a:endParaRPr lang="en-US" noProof="0"/>
+            <a:endParaRPr lang="en-US" noProof="0" dirty="0"/>
           </a:p>
         </p:txBody>
       </p:sp>
@@ -6577,7 +6569,7 @@
               <a:tabLst/>
               <a:defRPr/>
             </a:pPr>
-            <a:endParaRPr kumimoji="0" lang="en-US" altLang="ko-KR" sz="2398" b="0" i="0" u="none" strike="noStrike" kern="1200" cap="none" spc="0" normalizeH="0" baseline="0" noProof="0">
+            <a:endParaRPr kumimoji="0" lang="en-US" altLang="ko-KR" sz="2398" b="0" i="0" u="none" strike="noStrike" kern="1200" cap="none" spc="0" normalizeH="0" baseline="0" noProof="0" dirty="0">
               <a:ln>
                 <a:noFill/>
               </a:ln>
@@ -6747,7 +6739,7 @@
               <a:pPr/>
               <a:t>‹#›</a:t>
             </a:fld>
-            <a:endParaRPr lang="en-US" noProof="0"/>
+            <a:endParaRPr lang="en-US" noProof="0" dirty="0"/>
           </a:p>
         </p:txBody>
       </p:sp>
@@ -6942,7 +6934,7 @@
               <a:tabLst/>
               <a:defRPr/>
             </a:pPr>
-            <a:endParaRPr kumimoji="0" lang="en-US" altLang="ko-KR" sz="2398" b="0" i="0" u="none" strike="noStrike" kern="1200" cap="none" spc="0" normalizeH="0" baseline="0" noProof="0">
+            <a:endParaRPr kumimoji="0" lang="en-US" altLang="ko-KR" sz="2398" b="0" i="0" u="none" strike="noStrike" kern="1200" cap="none" spc="0" normalizeH="0" baseline="0" noProof="0" dirty="0">
               <a:ln>
                 <a:noFill/>
               </a:ln>
@@ -7112,7 +7104,7 @@
               <a:pPr/>
               <a:t>‹#›</a:t>
             </a:fld>
-            <a:endParaRPr lang="en-US" noProof="0"/>
+            <a:endParaRPr lang="en-US" noProof="0" dirty="0"/>
           </a:p>
         </p:txBody>
       </p:sp>
@@ -7174,7 +7166,7 @@
               <a:tabLst/>
               <a:defRPr/>
             </a:pPr>
-            <a:endParaRPr kumimoji="0" lang="en-US" altLang="ko-KR" sz="2398" b="0" i="0" u="none" strike="noStrike" kern="1200" cap="none" spc="0" normalizeH="0" baseline="0" noProof="0">
+            <a:endParaRPr kumimoji="0" lang="en-US" altLang="ko-KR" sz="2398" b="0" i="0" u="none" strike="noStrike" kern="1200" cap="none" spc="0" normalizeH="0" baseline="0" noProof="0" dirty="0">
               <a:ln>
                 <a:noFill/>
               </a:ln>
@@ -7487,7 +7479,7 @@
               <a:pPr/>
               <a:t>‹#›</a:t>
             </a:fld>
-            <a:endParaRPr lang="en-US" noProof="0"/>
+            <a:endParaRPr lang="en-US" noProof="0" dirty="0"/>
           </a:p>
         </p:txBody>
       </p:sp>
@@ -7555,7 +7547,7 @@
               <a:tabLst/>
               <a:defRPr/>
             </a:pPr>
-            <a:endParaRPr kumimoji="0" lang="en-US" altLang="ko-KR" sz="2398" b="0" i="0" u="none" strike="noStrike" kern="1200" cap="none" spc="0" normalizeH="0" baseline="0" noProof="0">
+            <a:endParaRPr kumimoji="0" lang="en-US" altLang="ko-KR" sz="2398" b="0" i="0" u="none" strike="noStrike" kern="1200" cap="none" spc="0" normalizeH="0" baseline="0" noProof="0" dirty="0">
               <a:ln>
                 <a:noFill/>
               </a:ln>
@@ -7868,7 +7860,7 @@
               <a:pPr/>
               <a:t>‹#›</a:t>
             </a:fld>
-            <a:endParaRPr lang="en-US" noProof="0"/>
+            <a:endParaRPr lang="en-US" noProof="0" dirty="0"/>
           </a:p>
         </p:txBody>
       </p:sp>
@@ -7936,7 +7928,7 @@
               <a:tabLst/>
               <a:defRPr/>
             </a:pPr>
-            <a:endParaRPr kumimoji="0" lang="en-US" altLang="ko-KR" sz="2398" b="0" i="0" u="none" strike="noStrike" kern="1200" cap="none" spc="0" normalizeH="0" baseline="0" noProof="0">
+            <a:endParaRPr kumimoji="0" lang="en-US" altLang="ko-KR" sz="2398" b="0" i="0" u="none" strike="noStrike" kern="1200" cap="none" spc="0" normalizeH="0" baseline="0" noProof="0" dirty="0">
               <a:ln>
                 <a:noFill/>
               </a:ln>
@@ -8203,7 +8195,7 @@
               <a:pPr/>
               <a:t>‹#›</a:t>
             </a:fld>
-            <a:endParaRPr lang="en-US" noProof="0"/>
+            <a:endParaRPr lang="en-US" noProof="0" dirty="0"/>
           </a:p>
         </p:txBody>
       </p:sp>
@@ -8271,7 +8263,7 @@
               <a:tabLst/>
               <a:defRPr/>
             </a:pPr>
-            <a:endParaRPr kumimoji="0" lang="en-US" altLang="ko-KR" sz="2398" b="0" i="0" u="none" strike="noStrike" kern="1200" cap="none" spc="0" normalizeH="0" baseline="0" noProof="0">
+            <a:endParaRPr kumimoji="0" lang="en-US" altLang="ko-KR" sz="2398" b="0" i="0" u="none" strike="noStrike" kern="1200" cap="none" spc="0" normalizeH="0" baseline="0" noProof="0" dirty="0">
               <a:ln>
                 <a:noFill/>
               </a:ln>
@@ -8639,7 +8631,7 @@
               <a:tabLst/>
               <a:defRPr/>
             </a:pPr>
-            <a:endParaRPr kumimoji="0" lang="en-US" altLang="ko-KR" sz="2398" b="0" i="0" u="none" strike="noStrike" kern="1200" cap="none" spc="0" normalizeH="0" baseline="0" noProof="0">
+            <a:endParaRPr kumimoji="0" lang="en-US" altLang="ko-KR" sz="2398" b="0" i="0" u="none" strike="noStrike" kern="1200" cap="none" spc="0" normalizeH="0" baseline="0" noProof="0" dirty="0">
               <a:ln>
                 <a:noFill/>
               </a:ln>
@@ -9363,12 +9355,8 @@
           <a:lstStyle/>
           <a:p>
             <a:r>
-              <a:rPr lang="en-US" dirty="0" err="1"/>
-              <a:t>SoftUni</a:t>
-            </a:r>
-            <a:r>
-              <a:rPr lang="en-US"/>
-              <a:t> Team</a:t>
+              <a:rPr lang="en-US" dirty="0"/>
+              <a:t>SoftUni Team</a:t>
             </a:r>
           </a:p>
         </p:txBody>
@@ -9394,7 +9382,7 @@
           <a:lstStyle/>
           <a:p>
             <a:r>
-              <a:rPr lang="en-US"/>
+              <a:rPr lang="en-US" dirty="0"/>
               <a:t>Technical Trainers</a:t>
             </a:r>
           </a:p>
@@ -9505,11 +9493,11 @@
           <a:lstStyle/>
           <a:p>
             <a:r>
-              <a:rPr lang="bg-BG"/>
+              <a:rPr lang="bg-BG" dirty="0"/>
               <a:t>Списък от обекти: </a:t>
             </a:r>
             <a:r>
-              <a:rPr lang="en-US"/>
+              <a:rPr lang="en-US" dirty="0"/>
               <a:t>List&lt;T&gt;</a:t>
             </a:r>
           </a:p>
@@ -9732,23 +9720,7 @@
                   <a:schemeClr val="tx1"/>
                 </a:solidFill>
               </a:rPr>
-              <a:t>using </a:t>
-            </a:r>
-            <a:r>
-              <a:rPr lang="en-US" sz="2400" dirty="0" err="1">
-                <a:solidFill>
-                  <a:schemeClr val="tx1"/>
-                </a:solidFill>
-              </a:rPr>
-              <a:t>System.Collections.Generic</a:t>
-            </a:r>
-            <a:r>
-              <a:rPr lang="en-US" sz="2400" dirty="0">
-                <a:solidFill>
-                  <a:schemeClr val="tx1"/>
-                </a:solidFill>
-              </a:rPr>
-              <a:t>;</a:t>
+              <a:t>using System.Collections.Generic;</a:t>
             </a:r>
           </a:p>
           <a:p>
@@ -9895,7 +9867,7 @@
               </a:spcAft>
             </a:pPr>
             <a:r>
-              <a:rPr lang="en-US" sz="2400" dirty="0" err="1">
+              <a:rPr lang="en-US" sz="2400" dirty="0">
                 <a:solidFill>
                   <a:schemeClr val="tx1"/>
                 </a:solidFill>
@@ -9903,20 +9875,12 @@
               <a:t>names.</a:t>
             </a:r>
             <a:r>
-              <a:rPr lang="en-US" sz="2400" dirty="0" err="1">
+              <a:rPr lang="en-US" sz="2400" dirty="0">
                 <a:solidFill>
                   <a:schemeClr val="bg1"/>
                 </a:solidFill>
               </a:rPr>
-              <a:t>Add</a:t>
-            </a:r>
-            <a:r>
-              <a:rPr lang="en-US" sz="2400" dirty="0">
-                <a:solidFill>
-                  <a:schemeClr val="bg1"/>
-                </a:solidFill>
-              </a:rPr>
-              <a:t>(</a:t>
+              <a:t>Add(</a:t>
             </a:r>
             <a:r>
               <a:rPr lang="en-US" sz="2400" dirty="0">
@@ -9953,7 +9917,7 @@
               </a:spcAft>
             </a:pPr>
             <a:r>
-              <a:rPr lang="en-US" sz="2400" dirty="0" err="1">
+              <a:rPr lang="en-US" sz="2400" dirty="0">
                 <a:solidFill>
                   <a:schemeClr val="tx1"/>
                 </a:solidFill>
@@ -9961,20 +9925,12 @@
               <a:t>names.</a:t>
             </a:r>
             <a:r>
-              <a:rPr lang="en-US" sz="2400" dirty="0" err="1">
+              <a:rPr lang="en-US" sz="2400" dirty="0">
                 <a:solidFill>
                   <a:schemeClr val="bg1"/>
                 </a:solidFill>
               </a:rPr>
-              <a:t>Add</a:t>
-            </a:r>
-            <a:r>
-              <a:rPr lang="en-US" sz="2400" dirty="0">
-                <a:solidFill>
-                  <a:schemeClr val="bg1"/>
-                </a:solidFill>
-              </a:rPr>
-              <a:t>(</a:t>
+              <a:t>Add(</a:t>
             </a:r>
             <a:r>
               <a:rPr lang="en-US" sz="2400" dirty="0">
@@ -10011,7 +9967,7 @@
               </a:spcAft>
             </a:pPr>
             <a:r>
-              <a:rPr lang="en-US" sz="2400" dirty="0" err="1">
+              <a:rPr lang="en-US" sz="2400" dirty="0">
                 <a:solidFill>
                   <a:schemeClr val="tx1"/>
                 </a:solidFill>
@@ -10019,20 +9975,12 @@
               <a:t>names.</a:t>
             </a:r>
             <a:r>
-              <a:rPr lang="en-US" sz="2400" dirty="0" err="1">
+              <a:rPr lang="en-US" sz="2400" dirty="0">
                 <a:solidFill>
                   <a:schemeClr val="bg1"/>
                 </a:solidFill>
               </a:rPr>
-              <a:t>Add</a:t>
-            </a:r>
-            <a:r>
-              <a:rPr lang="en-US" sz="2400" dirty="0">
-                <a:solidFill>
-                  <a:schemeClr val="bg1"/>
-                </a:solidFill>
-              </a:rPr>
-              <a:t>(</a:t>
+              <a:t>Add(</a:t>
             </a:r>
             <a:r>
               <a:rPr lang="en-US" sz="2400" dirty="0">
@@ -10130,23 +10078,7 @@
                   <a:schemeClr val="tx1"/>
                 </a:solidFill>
               </a:rPr>
-              <a:t>  </a:t>
-            </a:r>
-            <a:r>
-              <a:rPr lang="en-US" sz="2400" dirty="0" err="1">
-                <a:solidFill>
-                  <a:schemeClr val="tx1"/>
-                </a:solidFill>
-              </a:rPr>
-              <a:t>Console.WriteLine</a:t>
-            </a:r>
-            <a:r>
-              <a:rPr lang="en-US" sz="2400" dirty="0">
-                <a:solidFill>
-                  <a:schemeClr val="tx1"/>
-                </a:solidFill>
-              </a:rPr>
-              <a:t>(name);</a:t>
+              <a:t>  Console.WriteLine(name);</a:t>
             </a:r>
           </a:p>
         </p:txBody>
@@ -10277,7 +10209,7 @@
               <a:pPr/>
               <a:t>10</a:t>
             </a:fld>
-            <a:endParaRPr lang="en-US"/>
+            <a:endParaRPr lang="en-US" dirty="0"/>
           </a:p>
         </p:txBody>
       </p:sp>
@@ -10363,7 +10295,7 @@
             <a:p>
               <a:pPr algn="ctr"/>
               <a:r>
-                <a:rPr lang="en-US" sz="2799" b="1">
+                <a:rPr lang="en-US" sz="2799" b="1" dirty="0">
                   <a:solidFill>
                     <a:schemeClr val="tx1"/>
                   </a:solidFill>
@@ -10435,14 +10367,14 @@
             <a:p>
               <a:pPr algn="ctr"/>
               <a:r>
-                <a:rPr lang="en-GB" sz="2799" b="1">
+                <a:rPr lang="en-GB" sz="2799" b="1" dirty="0">
                   <a:solidFill>
                     <a:schemeClr val="tx1"/>
                   </a:solidFill>
                 </a:rPr>
                 <a:t>Maria</a:t>
               </a:r>
-              <a:endParaRPr lang="en-US" sz="2799" b="1">
+              <a:endParaRPr lang="en-US" sz="2799" b="1" dirty="0">
                 <a:solidFill>
                   <a:schemeClr val="tx1"/>
                 </a:solidFill>
@@ -10571,10 +10503,10 @@
                 <a:buSzPct val="70000"/>
               </a:pPr>
               <a:r>
-                <a:rPr lang="en-GB" sz="2999"/>
+                <a:rPr lang="en-GB" sz="2999" dirty="0"/>
                 <a:t>0</a:t>
               </a:r>
-              <a:endParaRPr lang="en-US" sz="2999"/>
+              <a:endParaRPr lang="en-US" sz="2999" dirty="0"/>
             </a:p>
           </p:txBody>
         </p:sp>
@@ -10622,10 +10554,10 @@
                 <a:buSzPct val="70000"/>
               </a:pPr>
               <a:r>
-                <a:rPr lang="en-GB" sz="2999"/>
+                <a:rPr lang="en-GB" sz="2999" dirty="0"/>
                 <a:t>1</a:t>
               </a:r>
-              <a:endParaRPr lang="en-US" sz="2999"/>
+              <a:endParaRPr lang="en-US" sz="2999" dirty="0"/>
             </a:p>
           </p:txBody>
         </p:sp>
@@ -10673,10 +10605,10 @@
                 <a:buSzPct val="70000"/>
               </a:pPr>
               <a:r>
-                <a:rPr lang="en-GB" sz="2999"/>
+                <a:rPr lang="en-GB" sz="2999" dirty="0"/>
                 <a:t>2</a:t>
               </a:r>
-              <a:endParaRPr lang="en-US" sz="2999"/>
+              <a:endParaRPr lang="en-US" sz="2999" dirty="0"/>
             </a:p>
           </p:txBody>
         </p:sp>
@@ -11480,7 +11412,7 @@
               <a:pPr/>
               <a:t>11</a:t>
             </a:fld>
-            <a:endParaRPr lang="en-US" noProof="0"/>
+            <a:endParaRPr lang="en-US" noProof="0" dirty="0"/>
           </a:p>
         </p:txBody>
       </p:sp>
@@ -11968,10 +11900,10 @@
           <a:lstStyle/>
           <a:p>
             <a:r>
-              <a:rPr lang="bg-BG"/>
-              <a:t>Списък от правоъгълници – пример </a:t>
-            </a:r>
-            <a:endParaRPr lang="en-US"/>
+              <a:rPr lang="bg-BG" dirty="0"/>
+              <a:t>Примери: Списък от правоъгълници </a:t>
+            </a:r>
+            <a:endParaRPr lang="en-US" dirty="0"/>
           </a:p>
         </p:txBody>
       </p:sp>
@@ -12161,23 +12093,7 @@
                   <a:schemeClr val="tx1"/>
                 </a:solidFill>
               </a:rPr>
-              <a:t> </a:t>
-            </a:r>
-            <a:r>
-              <a:rPr lang="en-US" sz="2400" dirty="0" err="1">
-                <a:solidFill>
-                  <a:schemeClr val="tx1"/>
-                </a:solidFill>
-              </a:rPr>
-              <a:t>rects</a:t>
-            </a:r>
-            <a:r>
-              <a:rPr lang="en-US" sz="2400" dirty="0">
-                <a:solidFill>
-                  <a:schemeClr val="tx1"/>
-                </a:solidFill>
-              </a:rPr>
-              <a:t> = </a:t>
+              <a:t> rects = </a:t>
             </a:r>
             <a:r>
               <a:rPr lang="en-US" sz="2400" dirty="0">
@@ -12238,7 +12154,7 @@
               </a:spcBef>
             </a:pPr>
             <a:r>
-              <a:rPr lang="en-US" sz="2400" dirty="0" err="1">
+              <a:rPr lang="en-US" sz="2400" dirty="0">
                 <a:solidFill>
                   <a:schemeClr val="tx1"/>
                 </a:solidFill>
@@ -12246,20 +12162,12 @@
               <a:t>rects.</a:t>
             </a:r>
             <a:r>
-              <a:rPr lang="en-US" sz="2400" dirty="0" err="1">
+              <a:rPr lang="en-US" sz="2400" dirty="0">
                 <a:solidFill>
                   <a:schemeClr val="bg1"/>
                 </a:solidFill>
               </a:rPr>
-              <a:t>Add</a:t>
-            </a:r>
-            <a:r>
-              <a:rPr lang="en-US" sz="2400" dirty="0">
-                <a:solidFill>
-                  <a:schemeClr val="bg1"/>
-                </a:solidFill>
-              </a:rPr>
-              <a:t>(</a:t>
+              <a:t>Add(</a:t>
             </a:r>
             <a:r>
               <a:rPr lang="en-US" sz="2400" dirty="0">
@@ -12293,7 +12201,7 @@
               </a:spcBef>
             </a:pPr>
             <a:r>
-              <a:rPr lang="en-US" sz="2400" dirty="0" err="1">
+              <a:rPr lang="en-US" sz="2400" dirty="0">
                 <a:solidFill>
                   <a:schemeClr val="tx1"/>
                 </a:solidFill>
@@ -12301,20 +12209,12 @@
               <a:t>rects.</a:t>
             </a:r>
             <a:r>
-              <a:rPr lang="en-US" sz="2400" dirty="0" err="1">
+              <a:rPr lang="en-US" sz="2400" dirty="0">
                 <a:solidFill>
                   <a:schemeClr val="bg1"/>
                 </a:solidFill>
               </a:rPr>
-              <a:t>Add</a:t>
-            </a:r>
-            <a:r>
-              <a:rPr lang="en-US" sz="2400" dirty="0">
-                <a:solidFill>
-                  <a:schemeClr val="bg1"/>
-                </a:solidFill>
-              </a:rPr>
-              <a:t>(</a:t>
+              <a:t>Add(</a:t>
             </a:r>
             <a:r>
               <a:rPr lang="en-US" sz="2400" dirty="0">
@@ -12348,7 +12248,7 @@
               </a:spcBef>
             </a:pPr>
             <a:r>
-              <a:rPr lang="en-US" sz="2400" dirty="0" err="1">
+              <a:rPr lang="en-US" sz="2400" dirty="0">
                 <a:solidFill>
                   <a:schemeClr val="tx1"/>
                 </a:solidFill>
@@ -12356,20 +12256,12 @@
               <a:t>rects.</a:t>
             </a:r>
             <a:r>
-              <a:rPr lang="en-US" sz="2400" dirty="0" err="1">
+              <a:rPr lang="en-US" sz="2400" dirty="0">
                 <a:solidFill>
                   <a:schemeClr val="bg1"/>
                 </a:solidFill>
               </a:rPr>
-              <a:t>Add</a:t>
-            </a:r>
-            <a:r>
-              <a:rPr lang="en-US" sz="2400" dirty="0">
-                <a:solidFill>
-                  <a:schemeClr val="bg1"/>
-                </a:solidFill>
-              </a:rPr>
-              <a:t>(</a:t>
+              <a:t>Add(</a:t>
             </a:r>
             <a:r>
               <a:rPr lang="en-US" sz="2400" dirty="0">
@@ -12438,65 +12330,17 @@
                   <a:schemeClr val="tx1"/>
                 </a:solidFill>
               </a:rPr>
-              <a:t>foreach (var r in </a:t>
-            </a:r>
-            <a:r>
-              <a:rPr lang="en-US" sz="2400" dirty="0" err="1">
+              <a:t>foreach (var r in rects)</a:t>
+            </a:r>
+          </a:p>
+          <a:p>
+            <a:r>
+              <a:rPr lang="en-US" sz="2400" dirty="0">
                 <a:solidFill>
                   <a:schemeClr val="tx1"/>
                 </a:solidFill>
               </a:rPr>
-              <a:t>rects</a:t>
-            </a:r>
-            <a:r>
-              <a:rPr lang="en-US" sz="2400" dirty="0">
-                <a:solidFill>
-                  <a:schemeClr val="tx1"/>
-                </a:solidFill>
-              </a:rPr>
-              <a:t>)</a:t>
-            </a:r>
-          </a:p>
-          <a:p>
-            <a:r>
-              <a:rPr lang="en-US" sz="2400" dirty="0">
-                <a:solidFill>
-                  <a:schemeClr val="tx1"/>
-                </a:solidFill>
-              </a:rPr>
-              <a:t>  </a:t>
-            </a:r>
-            <a:r>
-              <a:rPr lang="en-US" sz="2400" dirty="0" err="1">
-                <a:solidFill>
-                  <a:schemeClr val="tx1"/>
-                </a:solidFill>
-              </a:rPr>
-              <a:t>Console.WriteLine</a:t>
-            </a:r>
-            <a:r>
-              <a:rPr lang="en-US" sz="2400" dirty="0">
-                <a:solidFill>
-                  <a:schemeClr val="tx1"/>
-                </a:solidFill>
-              </a:rPr>
-              <a:t>($"</a:t>
-            </a:r>
-            <a:r>
-              <a:rPr lang="en-US" sz="2400" dirty="0" err="1">
-                <a:solidFill>
-                  <a:schemeClr val="tx1"/>
-                </a:solidFill>
-              </a:rPr>
-              <a:t>Rect</a:t>
-            </a:r>
-            <a:r>
-              <a:rPr lang="en-US" sz="2400" dirty="0">
-                <a:solidFill>
-                  <a:schemeClr val="tx1"/>
-                </a:solidFill>
-              </a:rPr>
-              <a:t>({r.width},</a:t>
+              <a:t>  Console.WriteLine($"Rect({r.width},</a:t>
             </a:r>
             <a:r>
               <a:rPr lang="en-US" sz="2400" dirty="0">
@@ -13002,10 +12846,10 @@
           <a:lstStyle/>
           <a:p>
             <a:r>
-              <a:rPr lang="bg-BG"/>
-              <a:t>Списък от правоъгълници – пример </a:t>
-            </a:r>
-            <a:endParaRPr lang="en-US"/>
+              <a:rPr lang="bg-BG" dirty="0"/>
+              <a:t>Примери: Списък от правоъгълници </a:t>
+            </a:r>
+            <a:endParaRPr lang="en-US" dirty="0"/>
           </a:p>
         </p:txBody>
       </p:sp>
@@ -13225,7 +13069,7 @@
               </a:spcAft>
             </a:pPr>
             <a:r>
-              <a:rPr lang="en-US" sz="2400" dirty="0" err="1">
+              <a:rPr lang="en-US" sz="2400" dirty="0">
                 <a:solidFill>
                   <a:schemeClr val="tx1"/>
                 </a:solidFill>
@@ -13233,20 +13077,12 @@
               <a:t>rects.</a:t>
             </a:r>
             <a:r>
-              <a:rPr lang="en-US" sz="2400" dirty="0" err="1">
+              <a:rPr lang="en-US" sz="2400" dirty="0">
                 <a:solidFill>
                   <a:schemeClr val="bg1"/>
                 </a:solidFill>
               </a:rPr>
-              <a:t>RemoveAt</a:t>
-            </a:r>
-            <a:r>
-              <a:rPr lang="en-US" sz="2400" dirty="0">
-                <a:solidFill>
-                  <a:schemeClr val="bg1"/>
-                </a:solidFill>
-              </a:rPr>
-              <a:t>(</a:t>
+              <a:t>RemoveAt(</a:t>
             </a:r>
             <a:r>
               <a:rPr lang="en-US" sz="2400" dirty="0">
@@ -13283,7 +13119,7 @@
               </a:spcAft>
             </a:pPr>
             <a:r>
-              <a:rPr lang="en-US" sz="2400" dirty="0" err="1">
+              <a:rPr lang="en-US" sz="2400" dirty="0">
                 <a:solidFill>
                   <a:schemeClr val="tx1"/>
                 </a:solidFill>
@@ -13291,20 +13127,12 @@
               <a:t>rects.</a:t>
             </a:r>
             <a:r>
-              <a:rPr lang="en-US" sz="2400" dirty="0" err="1">
+              <a:rPr lang="en-US" sz="2400" dirty="0">
                 <a:solidFill>
                   <a:schemeClr val="bg1"/>
                 </a:solidFill>
               </a:rPr>
-              <a:t>Insert</a:t>
-            </a:r>
-            <a:r>
-              <a:rPr lang="en-US" sz="2400" dirty="0">
-                <a:solidFill>
-                  <a:schemeClr val="bg1"/>
-                </a:solidFill>
-              </a:rPr>
-              <a:t>(</a:t>
+              <a:t>Insert(</a:t>
             </a:r>
             <a:r>
               <a:rPr lang="en-US" sz="2400" dirty="0">
@@ -13384,15 +13212,23 @@
                   <a:schemeClr val="tx1"/>
                 </a:solidFill>
               </a:rPr>
-              <a:t>for (int </a:t>
-            </a:r>
-            <a:r>
-              <a:rPr lang="en-US" sz="2400" dirty="0" err="1">
+              <a:t>for (int i</a:t>
+            </a:r>
+            <a:r>
+              <a:rPr lang="bg-BG" sz="2400" dirty="0">
                 <a:solidFill>
                   <a:schemeClr val="tx1"/>
                 </a:solidFill>
               </a:rPr>
-              <a:t>i</a:t>
+              <a:t> </a:t>
+            </a:r>
+            <a:r>
+              <a:rPr lang="en-US" sz="2400" dirty="0">
+                <a:solidFill>
+                  <a:schemeClr val="tx1"/>
+                </a:solidFill>
+              </a:rPr>
+              <a:t>=</a:t>
             </a:r>
             <a:r>
               <a:rPr lang="bg-BG" sz="2400" dirty="0">
@@ -13408,7 +13244,7 @@
                   <a:schemeClr val="tx1"/>
                 </a:solidFill>
               </a:rPr>
-              <a:t>=</a:t>
+              <a:t>0; i</a:t>
             </a:r>
             <a:r>
               <a:rPr lang="bg-BG" sz="2400" dirty="0">
@@ -13424,71 +13260,23 @@
                   <a:schemeClr val="tx1"/>
                 </a:solidFill>
               </a:rPr>
-              <a:t>0; </a:t>
-            </a:r>
-            <a:r>
-              <a:rPr lang="en-US" sz="2400" dirty="0" err="1">
+              <a:t>&lt;</a:t>
+            </a:r>
+            <a:r>
+              <a:rPr lang="bg-BG" sz="2400" dirty="0">
                 <a:solidFill>
                   <a:schemeClr val="tx1"/>
                 </a:solidFill>
               </a:rPr>
-              <a:t>i</a:t>
-            </a:r>
-            <a:r>
-              <a:rPr lang="bg-BG" sz="2400" dirty="0">
+              <a:t> </a:t>
+            </a:r>
+            <a:r>
+              <a:rPr lang="en-US" sz="2400" dirty="0">
                 <a:solidFill>
                   <a:schemeClr val="tx1"/>
                 </a:solidFill>
               </a:rPr>
-              <a:t> </a:t>
-            </a:r>
-            <a:r>
-              <a:rPr lang="en-US" sz="2400" dirty="0">
-                <a:solidFill>
-                  <a:schemeClr val="tx1"/>
-                </a:solidFill>
-              </a:rPr>
-              <a:t>&lt;</a:t>
-            </a:r>
-            <a:r>
-              <a:rPr lang="bg-BG" sz="2400" dirty="0">
-                <a:solidFill>
-                  <a:schemeClr val="tx1"/>
-                </a:solidFill>
-              </a:rPr>
-              <a:t> </a:t>
-            </a:r>
-            <a:r>
-              <a:rPr lang="en-US" sz="2400" dirty="0" err="1">
-                <a:solidFill>
-                  <a:schemeClr val="tx1"/>
-                </a:solidFill>
-              </a:rPr>
-              <a:t>rects.Count</a:t>
-            </a:r>
-            <a:r>
-              <a:rPr lang="en-US" sz="2400" dirty="0">
-                <a:solidFill>
-                  <a:schemeClr val="tx1"/>
-                </a:solidFill>
-              </a:rPr>
-              <a:t>; </a:t>
-            </a:r>
-            <a:r>
-              <a:rPr lang="en-US" sz="2400" dirty="0" err="1">
-                <a:solidFill>
-                  <a:schemeClr val="tx1"/>
-                </a:solidFill>
-              </a:rPr>
-              <a:t>i</a:t>
-            </a:r>
-            <a:r>
-              <a:rPr lang="en-US" sz="2400" dirty="0">
-                <a:solidFill>
-                  <a:schemeClr val="tx1"/>
-                </a:solidFill>
-              </a:rPr>
-              <a:t>++)</a:t>
+              <a:t>rects.Count; i++)</a:t>
             </a:r>
           </a:p>
           <a:p>
@@ -13532,52 +13320,12 @@
               <a:t>  </a:t>
             </a:r>
             <a:r>
-              <a:rPr lang="en-US" sz="2400" dirty="0" err="1">
+              <a:rPr lang="en-US" sz="2400" dirty="0">
                 <a:solidFill>
                   <a:schemeClr val="tx1"/>
                 </a:solidFill>
               </a:rPr>
-              <a:t>Console.WriteLine</a:t>
-            </a:r>
-            <a:r>
-              <a:rPr lang="en-US" sz="2400" dirty="0">
-                <a:solidFill>
-                  <a:schemeClr val="tx1"/>
-                </a:solidFill>
-              </a:rPr>
-              <a:t>($"</a:t>
-            </a:r>
-            <a:r>
-              <a:rPr lang="en-US" sz="2400" dirty="0" err="1">
-                <a:solidFill>
-                  <a:schemeClr val="tx1"/>
-                </a:solidFill>
-              </a:rPr>
-              <a:t>Rect</a:t>
-            </a:r>
-            <a:r>
-              <a:rPr lang="en-US" sz="2400" dirty="0">
-                <a:solidFill>
-                  <a:schemeClr val="tx1"/>
-                </a:solidFill>
-              </a:rPr>
-              <a:t> #{</a:t>
-            </a:r>
-            <a:r>
-              <a:rPr lang="en-US" sz="2400" dirty="0" err="1">
-                <a:solidFill>
-                  <a:schemeClr val="tx1"/>
-                </a:solidFill>
-              </a:rPr>
-              <a:t>i</a:t>
-            </a:r>
-            <a:r>
-              <a:rPr lang="en-US" sz="2400" dirty="0">
-                <a:solidFill>
-                  <a:schemeClr val="tx1"/>
-                </a:solidFill>
-              </a:rPr>
-              <a:t>}:"):</a:t>
+              <a:t>Console.WriteLine($"Rect #{i}:"):</a:t>
             </a:r>
           </a:p>
           <a:p>
@@ -13595,55 +13343,7 @@
                   <a:schemeClr val="tx1"/>
                 </a:solidFill>
               </a:rPr>
-              <a:t>  </a:t>
-            </a:r>
-            <a:r>
-              <a:rPr lang="en-US" sz="2400" dirty="0" err="1">
-                <a:solidFill>
-                  <a:schemeClr val="tx1"/>
-                </a:solidFill>
-              </a:rPr>
-              <a:t>Console.WriteLine</a:t>
-            </a:r>
-            <a:r>
-              <a:rPr lang="en-US" sz="2400" dirty="0">
-                <a:solidFill>
-                  <a:schemeClr val="tx1"/>
-                </a:solidFill>
-              </a:rPr>
-              <a:t>($"  Width: {</a:t>
-            </a:r>
-            <a:r>
-              <a:rPr lang="en-US" sz="2400" dirty="0" err="1">
-                <a:solidFill>
-                  <a:schemeClr val="tx1"/>
-                </a:solidFill>
-              </a:rPr>
-              <a:t>rects</a:t>
-            </a:r>
-            <a:r>
-              <a:rPr lang="en-US" sz="2400" dirty="0">
-                <a:solidFill>
-                  <a:schemeClr val="tx1"/>
-                </a:solidFill>
-              </a:rPr>
-              <a:t>[</a:t>
-            </a:r>
-            <a:r>
-              <a:rPr lang="en-US" sz="2400" dirty="0" err="1">
-                <a:solidFill>
-                  <a:schemeClr val="tx1"/>
-                </a:solidFill>
-              </a:rPr>
-              <a:t>i</a:t>
-            </a:r>
-            <a:r>
-              <a:rPr lang="en-US" sz="2400" dirty="0">
-                <a:solidFill>
-                  <a:schemeClr val="tx1"/>
-                </a:solidFill>
-              </a:rPr>
-              <a:t>].width}");</a:t>
+              <a:t>  Console.WriteLine($"  Width: {rects[i].width}");</a:t>
             </a:r>
           </a:p>
           <a:p>
@@ -13661,55 +13361,7 @@
                   <a:schemeClr val="tx1"/>
                 </a:solidFill>
               </a:rPr>
-              <a:t>  </a:t>
-            </a:r>
-            <a:r>
-              <a:rPr lang="en-US" sz="2400" dirty="0" err="1">
-                <a:solidFill>
-                  <a:schemeClr val="tx1"/>
-                </a:solidFill>
-              </a:rPr>
-              <a:t>Console.WriteLine</a:t>
-            </a:r>
-            <a:r>
-              <a:rPr lang="en-US" sz="2400" dirty="0">
-                <a:solidFill>
-                  <a:schemeClr val="tx1"/>
-                </a:solidFill>
-              </a:rPr>
-              <a:t>($"  Height: {</a:t>
-            </a:r>
-            <a:r>
-              <a:rPr lang="en-US" sz="2400" dirty="0" err="1">
-                <a:solidFill>
-                  <a:schemeClr val="tx1"/>
-                </a:solidFill>
-              </a:rPr>
-              <a:t>rects</a:t>
-            </a:r>
-            <a:r>
-              <a:rPr lang="en-US" sz="2400" dirty="0">
-                <a:solidFill>
-                  <a:schemeClr val="tx1"/>
-                </a:solidFill>
-              </a:rPr>
-              <a:t>[</a:t>
-            </a:r>
-            <a:r>
-              <a:rPr lang="en-US" sz="2400" dirty="0" err="1">
-                <a:solidFill>
-                  <a:schemeClr val="tx1"/>
-                </a:solidFill>
-              </a:rPr>
-              <a:t>i</a:t>
-            </a:r>
-            <a:r>
-              <a:rPr lang="en-US" sz="2400" dirty="0">
-                <a:solidFill>
-                  <a:schemeClr val="tx1"/>
-                </a:solidFill>
-              </a:rPr>
-              <a:t>].height}");</a:t>
+              <a:t>  Console.WriteLine($"  Height: {rects[i].height}");</a:t>
             </a:r>
           </a:p>
           <a:p>
@@ -13727,55 +13379,7 @@
                   <a:schemeClr val="tx1"/>
                 </a:solidFill>
               </a:rPr>
-              <a:t>  </a:t>
-            </a:r>
-            <a:r>
-              <a:rPr lang="en-US" sz="2400" dirty="0" err="1">
-                <a:solidFill>
-                  <a:schemeClr val="tx1"/>
-                </a:solidFill>
-              </a:rPr>
-              <a:t>Console.WriteLine</a:t>
-            </a:r>
-            <a:r>
-              <a:rPr lang="en-US" sz="2400" dirty="0">
-                <a:solidFill>
-                  <a:schemeClr val="tx1"/>
-                </a:solidFill>
-              </a:rPr>
-              <a:t>($"  Color: {</a:t>
-            </a:r>
-            <a:r>
-              <a:rPr lang="en-US" sz="2400" dirty="0" err="1">
-                <a:solidFill>
-                  <a:schemeClr val="tx1"/>
-                </a:solidFill>
-              </a:rPr>
-              <a:t>rects</a:t>
-            </a:r>
-            <a:r>
-              <a:rPr lang="en-US" sz="2400" dirty="0">
-                <a:solidFill>
-                  <a:schemeClr val="tx1"/>
-                </a:solidFill>
-              </a:rPr>
-              <a:t>[</a:t>
-            </a:r>
-            <a:r>
-              <a:rPr lang="en-US" sz="2400" dirty="0" err="1">
-                <a:solidFill>
-                  <a:schemeClr val="tx1"/>
-                </a:solidFill>
-              </a:rPr>
-              <a:t>i</a:t>
-            </a:r>
-            <a:r>
-              <a:rPr lang="en-US" sz="2400" dirty="0">
-                <a:solidFill>
-                  <a:schemeClr val="tx1"/>
-                </a:solidFill>
-              </a:rPr>
-              <a:t>].color}");</a:t>
+              <a:t>  Console.WriteLine($"  Color: {rects[i].color}");</a:t>
             </a:r>
           </a:p>
           <a:p>
@@ -13924,7 +13528,7 @@
               <a:pPr/>
               <a:t>13</a:t>
             </a:fld>
-            <a:endParaRPr lang="en-US"/>
+            <a:endParaRPr lang="en-US" dirty="0"/>
           </a:p>
         </p:txBody>
       </p:sp>
@@ -14316,7 +13920,7 @@
           <a:lstStyle/>
           <a:p>
             <a:r>
-              <a:rPr lang="bg-BG"/>
+              <a:rPr lang="bg-BG" dirty="0"/>
               <a:t>Сортиране на списък</a:t>
             </a:r>
           </a:p>
@@ -14597,7 +14201,7 @@
               <a:pPr/>
               <a:t>14</a:t>
             </a:fld>
-            <a:endParaRPr lang="en-US" noProof="0"/>
+            <a:endParaRPr lang="en-US" noProof="0" dirty="0"/>
           </a:p>
         </p:txBody>
       </p:sp>
@@ -15001,29 +14605,29 @@
           <a:p>
             <a:pPr lvl="0"/>
             <a:r>
-              <a:rPr lang="en-US"/>
+              <a:rPr lang="en-US" dirty="0"/>
               <a:t>…</a:t>
             </a:r>
           </a:p>
           <a:p>
             <a:pPr lvl="0"/>
             <a:r>
-              <a:rPr lang="en-GB"/>
+              <a:rPr lang="en-GB" dirty="0"/>
               <a:t>…</a:t>
             </a:r>
-            <a:endParaRPr lang="en-US"/>
+            <a:endParaRPr lang="en-US" dirty="0"/>
           </a:p>
           <a:p>
             <a:pPr lvl="0"/>
             <a:r>
-              <a:rPr lang="en-GB"/>
+              <a:rPr lang="en-GB" dirty="0"/>
               <a:t>…</a:t>
             </a:r>
-            <a:endParaRPr lang="en-US"/>
+            <a:endParaRPr lang="en-US" dirty="0"/>
           </a:p>
           <a:p>
             <a:pPr lvl="0"/>
-            <a:endParaRPr lang="en-US"/>
+            <a:endParaRPr lang="en-US" dirty="0"/>
           </a:p>
         </p:txBody>
       </p:sp>
@@ -15045,10 +14649,10 @@
           <a:lstStyle/>
           <a:p>
             <a:r>
-              <a:rPr lang="bg-BG"/>
+              <a:rPr lang="bg-BG" dirty="0"/>
               <a:t>Обобщение</a:t>
             </a:r>
-            <a:endParaRPr lang="en-US"/>
+            <a:endParaRPr lang="en-US" dirty="0"/>
           </a:p>
         </p:txBody>
       </p:sp>
@@ -15122,7 +14726,7 @@
             <a:lstStyle/>
             <a:p>
               <a:pPr algn="ctr"/>
-              <a:endParaRPr lang="ko-KR" altLang="en-US" sz="2398"/>
+              <a:endParaRPr lang="ko-KR" altLang="en-US" sz="2398" dirty="0"/>
             </a:p>
           </p:txBody>
         </p:sp>
@@ -15178,7 +14782,7 @@
             <a:lstStyle/>
             <a:p>
               <a:pPr algn="ctr"/>
-              <a:endParaRPr lang="ko-KR" altLang="en-US" sz="2398">
+              <a:endParaRPr lang="ko-KR" altLang="en-US" sz="2398" dirty="0">
                 <a:solidFill>
                   <a:schemeClr val="bg1"/>
                 </a:solidFill>
@@ -15239,7 +14843,7 @@
             <a:lstStyle/>
             <a:p>
               <a:pPr algn="ctr"/>
-              <a:endParaRPr lang="ko-KR" altLang="en-US" sz="2398">
+              <a:endParaRPr lang="ko-KR" altLang="en-US" sz="2398" dirty="0">
                 <a:solidFill>
                   <a:schemeClr val="tx1"/>
                 </a:solidFill>
@@ -15468,7 +15072,7 @@
                   </a:schemeClr>
                 </a:solidFill>
               </a:rPr>
-              <a:t>инстанциране </a:t>
+              <a:t>инстанцииране </a:t>
             </a:r>
             <a:r>
               <a:rPr lang="bg-BG" sz="3900" dirty="0">
@@ -15715,7 +15319,7 @@
               <a:pPr/>
               <a:t>15</a:t>
             </a:fld>
-            <a:endParaRPr lang="en-US" noProof="0"/>
+            <a:endParaRPr lang="en-US" noProof="0" dirty="0"/>
           </a:p>
         </p:txBody>
       </p:sp>
@@ -16054,7 +15658,7 @@
           <a:lstStyle/>
           <a:p>
             <a:r>
-              <a:rPr lang="bg-BG" sz="8800">
+              <a:rPr lang="bg-BG" sz="8800" dirty="0">
                 <a:solidFill>
                   <a:srgbClr val="234465"/>
                 </a:solidFill>
@@ -16062,14 +15666,14 @@
               <a:t>Въпроси</a:t>
             </a:r>
             <a:r>
-              <a:rPr lang="en-US" sz="8800">
+              <a:rPr lang="en-US" sz="8800" dirty="0">
                 <a:solidFill>
                   <a:srgbClr val="234465"/>
                 </a:solidFill>
               </a:rPr>
               <a:t>?</a:t>
             </a:r>
-            <a:endParaRPr lang="en-US" sz="8800"/>
+            <a:endParaRPr lang="en-US" sz="8800" dirty="0"/>
           </a:p>
         </p:txBody>
       </p:sp>
@@ -16143,34 +15747,34 @@
               </a:lnSpc>
             </a:pPr>
             <a:r>
-              <a:rPr lang="bg-BG"/>
+              <a:rPr lang="bg-BG" dirty="0"/>
               <a:t>Този курс</a:t>
             </a:r>
             <a:r>
-              <a:rPr lang="en-US"/>
+              <a:rPr lang="en-US" dirty="0"/>
               <a:t> (</a:t>
             </a:r>
             <a:r>
-              <a:rPr lang="bg-BG"/>
+              <a:rPr lang="bg-BG" dirty="0"/>
               <a:t>презентации, примери, демонстрационен код, упражнения, домашни, видео и други активи</a:t>
             </a:r>
             <a:r>
-              <a:rPr lang="en-US"/>
+              <a:rPr lang="en-US" dirty="0"/>
               <a:t>) </a:t>
             </a:r>
             <a:r>
-              <a:rPr lang="bg-BG"/>
+              <a:rPr lang="bg-BG" dirty="0"/>
               <a:t>представлява</a:t>
             </a:r>
             <a:r>
-              <a:rPr lang="en-US"/>
+              <a:rPr lang="en-US" dirty="0"/>
               <a:t> </a:t>
             </a:r>
             <a:r>
-              <a:rPr lang="bg-BG" b="1"/>
+              <a:rPr lang="bg-BG" b="1" dirty="0"/>
               <a:t>защитено авторско съдържание</a:t>
             </a:r>
-            <a:endParaRPr lang="en-US"/>
+            <a:endParaRPr lang="en-US" dirty="0"/>
           </a:p>
           <a:p>
             <a:pPr>
@@ -16179,15 +15783,15 @@
               </a:lnSpc>
             </a:pPr>
             <a:r>
-              <a:rPr lang="bg-BG"/>
+              <a:rPr lang="bg-BG" dirty="0"/>
               <a:t>Нерегламентирано копиране</a:t>
             </a:r>
             <a:r>
-              <a:rPr lang="en-US"/>
+              <a:rPr lang="en-US" dirty="0"/>
               <a:t>,</a:t>
             </a:r>
             <a:r>
-              <a:rPr lang="bg-BG"/>
+              <a:rPr lang="bg-BG" dirty="0"/>
               <a:t> разпространение или използване е незаконно</a:t>
             </a:r>
           </a:p>
@@ -16198,24 +15802,24 @@
               </a:lnSpc>
             </a:pPr>
             <a:r>
-              <a:rPr lang="en-US"/>
+              <a:rPr lang="en-US" dirty="0"/>
               <a:t>© </a:t>
             </a:r>
             <a:r>
-              <a:rPr lang="bg-BG" err="1"/>
+              <a:rPr lang="bg-BG" dirty="0"/>
               <a:t>СофтУни</a:t>
             </a:r>
             <a:r>
-              <a:rPr lang="en-US"/>
+              <a:rPr lang="en-US" dirty="0"/>
               <a:t> – </a:t>
             </a:r>
             <a:r>
-              <a:rPr lang="en-US">
+              <a:rPr lang="en-US" dirty="0">
                 <a:hlinkClick r:id="rId3"/>
               </a:rPr>
               <a:t>https://softuni.org</a:t>
             </a:r>
-            <a:endParaRPr lang="en-US"/>
+            <a:endParaRPr lang="en-US" dirty="0"/>
           </a:p>
           <a:p>
             <a:pPr>
@@ -16224,24 +15828,24 @@
               </a:lnSpc>
             </a:pPr>
             <a:r>
-              <a:rPr lang="en-US"/>
+              <a:rPr lang="en-US" dirty="0"/>
               <a:t>© </a:t>
             </a:r>
             <a:r>
-              <a:rPr lang="bg-BG"/>
+              <a:rPr lang="bg-BG" dirty="0"/>
               <a:t>Софтуерен университет</a:t>
             </a:r>
             <a:r>
-              <a:rPr lang="en-US"/>
+              <a:rPr lang="en-US" dirty="0"/>
               <a:t> – </a:t>
             </a:r>
             <a:r>
-              <a:rPr lang="en-US">
+              <a:rPr lang="en-US" dirty="0">
                 <a:hlinkClick r:id="rId4"/>
               </a:rPr>
               <a:t>https://softuni.bg</a:t>
             </a:r>
-            <a:endParaRPr lang="bg-BG"/>
+            <a:endParaRPr lang="bg-BG" dirty="0"/>
           </a:p>
           <a:p>
             <a:pPr>
@@ -16249,7 +15853,7 @@
                 <a:spcPct val="120000"/>
               </a:lnSpc>
             </a:pPr>
-            <a:endParaRPr lang="bg-BG"/>
+            <a:endParaRPr lang="bg-BG" dirty="0"/>
           </a:p>
         </p:txBody>
       </p:sp>
@@ -16316,7 +15920,7 @@
           <a:lstStyle/>
           <a:p>
             <a:r>
-              <a:rPr lang="bg-BG"/>
+              <a:rPr lang="bg-BG" dirty="0"/>
               <a:t>Лиценз</a:t>
             </a:r>
           </a:p>
@@ -16360,7 +15964,7 @@
               <a:pPr/>
               <a:t>17</a:t>
             </a:fld>
-            <a:endParaRPr lang="en-US" noProof="0"/>
+            <a:endParaRPr lang="en-US" noProof="0" dirty="0"/>
           </a:p>
         </p:txBody>
       </p:sp>
@@ -16435,7 +16039,7 @@
             </a:pPr>
             <a:r>
               <a:rPr lang="bg-BG" sz="4000" dirty="0"/>
-              <a:t>Инстанциране на клас</a:t>
+              <a:t>Дистанциране на клас</a:t>
             </a:r>
             <a:endParaRPr lang="en-GB" sz="4000" dirty="0"/>
           </a:p>
@@ -16524,10 +16128,10 @@
           <a:lstStyle/>
           <a:p>
             <a:r>
-              <a:rPr lang="bg-BG"/>
+              <a:rPr lang="bg-BG" dirty="0"/>
               <a:t>Съдържание</a:t>
             </a:r>
-            <a:endParaRPr lang="en-US"/>
+            <a:endParaRPr lang="en-US" dirty="0"/>
           </a:p>
         </p:txBody>
       </p:sp>
@@ -16657,7 +16261,7 @@
               <a:pPr/>
               <a:t>2</a:t>
             </a:fld>
-            <a:endParaRPr lang="en-US"/>
+            <a:endParaRPr lang="en-US" dirty="0"/>
           </a:p>
         </p:txBody>
       </p:sp>
@@ -16999,7 +16603,7 @@
               <a:rPr lang="bg-BG" dirty="0"/>
               <a:t>Референция към обекта</a:t>
             </a:r>
-            <a:endParaRPr lang="en-BG" dirty="0"/>
+            <a:endParaRPr lang="en-BG"/>
           </a:p>
         </p:txBody>
       </p:sp>
@@ -17026,7 +16630,7 @@
           <a:p>
             <a:r>
               <a:rPr lang="bg-BG" dirty="0"/>
-              <a:t>Инстанциране на клас</a:t>
+              <a:t>Инстанцииране на клас</a:t>
             </a:r>
             <a:endParaRPr lang="en-US" dirty="0"/>
           </a:p>
@@ -17137,7 +16741,7 @@
           <a:p>
             <a:r>
               <a:rPr lang="bg-BG" sz="3200" dirty="0"/>
-              <a:t>При всяко инстанциране на класа се създава </a:t>
+              <a:t>При всяко инстанцииране на класа се създава </a:t>
             </a:r>
             <a:r>
               <a:rPr lang="bg-BG" sz="3200" b="1" dirty="0">
@@ -17807,7 +17411,7 @@
               <a:pPr/>
               <a:t>4</a:t>
             </a:fld>
-            <a:endParaRPr lang="en-US" noProof="0"/>
+            <a:endParaRPr lang="en-US" noProof="0" dirty="0"/>
           </a:p>
         </p:txBody>
       </p:sp>
@@ -17937,7 +17541,7 @@
               <a:pPr/>
               <a:t>4</a:t>
             </a:fld>
-            <a:endParaRPr lang="en-US"/>
+            <a:endParaRPr lang="en-US" dirty="0"/>
           </a:p>
         </p:txBody>
       </p:sp>
@@ -18317,10 +17921,10 @@
           <a:lstStyle/>
           <a:p>
             <a:r>
-              <a:rPr lang="bg-BG"/>
+              <a:rPr lang="bg-BG" dirty="0"/>
               <a:t>Референция към обекта</a:t>
             </a:r>
-            <a:endParaRPr lang="en-GB"/>
+            <a:endParaRPr lang="en-GB" dirty="0"/>
           </a:p>
         </p:txBody>
       </p:sp>
@@ -18629,7 +18233,7 @@
             <a:lstStyle/>
             <a:p>
               <a:pPr algn="ctr"/>
-              <a:endParaRPr lang="en-US" sz="2799" b="1">
+              <a:endParaRPr lang="en-US" sz="2799" b="1" dirty="0">
                 <a:solidFill>
                   <a:srgbClr val="FFFFFF"/>
                 </a:solidFill>
@@ -18706,14 +18310,14 @@
             <a:p>
               <a:pPr algn="ctr"/>
               <a:r>
-                <a:rPr lang="en-GB" sz="2799" b="1">
+                <a:rPr lang="en-GB" sz="2799" b="1" dirty="0">
                   <a:solidFill>
                     <a:srgbClr val="FFFFFF"/>
                   </a:solidFill>
                 </a:rPr>
                 <a:t>Heap</a:t>
               </a:r>
-              <a:endParaRPr lang="en-US" sz="2799" b="1">
+              <a:endParaRPr lang="en-US" sz="2799" b="1" dirty="0">
                 <a:solidFill>
                   <a:srgbClr val="FFFFFF"/>
                 </a:solidFill>
@@ -18782,7 +18386,7 @@
             <a:lstStyle/>
             <a:p>
               <a:pPr algn="ctr"/>
-              <a:endParaRPr lang="en-US" sz="2799" b="1">
+              <a:endParaRPr lang="en-US" sz="2799" b="1" dirty="0">
                 <a:solidFill>
                   <a:srgbClr val="FFFFFF"/>
                 </a:solidFill>
@@ -18859,14 +18463,14 @@
             <a:p>
               <a:pPr algn="ctr"/>
               <a:r>
-                <a:rPr lang="en-GB" sz="2799" b="1">
+                <a:rPr lang="en-GB" sz="2799" b="1" dirty="0">
                   <a:solidFill>
                     <a:srgbClr val="FFFFFF"/>
                   </a:solidFill>
                 </a:rPr>
                 <a:t>Stack</a:t>
               </a:r>
-              <a:endParaRPr lang="en-US" sz="2799" b="1">
+              <a:endParaRPr lang="en-US" sz="2799" b="1" dirty="0">
                 <a:solidFill>
                   <a:srgbClr val="FFFFFF"/>
                 </a:solidFill>
@@ -18967,7 +18571,7 @@
               <a:p>
                 <a:pPr algn="ctr"/>
                 <a:r>
-                  <a:rPr lang="en-GB" sz="2399" b="1">
+                  <a:rPr lang="en-GB" sz="2399" b="1" dirty="0">
                     <a:solidFill>
                       <a:srgbClr val="FFFFFF"/>
                     </a:solidFill>
@@ -19021,10 +18625,10 @@
                   <a:buSzPct val="70000"/>
                 </a:pPr>
                 <a:r>
-                  <a:rPr lang="en-GB" sz="2399" b="1"/>
+                  <a:rPr lang="en-GB" sz="2399" b="1" dirty="0"/>
                   <a:t>object</a:t>
                 </a:r>
-                <a:endParaRPr lang="en-US" sz="2399" b="1"/>
+                <a:endParaRPr lang="en-US" sz="2399" b="1" dirty="0"/>
               </a:p>
             </p:txBody>
           </p:sp>
@@ -19090,7 +18694,7 @@
               <a:p>
                 <a:pPr algn="ctr"/>
                 <a:r>
-                  <a:rPr lang="en-GB" sz="2399" b="1">
+                  <a:rPr lang="en-GB" sz="2399" b="1" dirty="0">
                     <a:solidFill>
                       <a:srgbClr val="FFFFFF"/>
                     </a:solidFill>
@@ -19098,14 +18702,14 @@
                   <a:t>Width = </a:t>
                 </a:r>
                 <a:r>
-                  <a:rPr lang="bg-BG" sz="2399" b="1">
+                  <a:rPr lang="bg-BG" sz="2399" b="1" dirty="0">
                     <a:solidFill>
                       <a:srgbClr val="FFFFFF"/>
                     </a:solidFill>
                   </a:rPr>
                   <a:t>0</a:t>
                 </a:r>
-                <a:endParaRPr lang="en-GB" sz="2399" b="1">
+                <a:endParaRPr lang="en-GB" sz="2399" b="1" dirty="0">
                   <a:solidFill>
                     <a:srgbClr val="FFFFFF"/>
                   </a:solidFill>
@@ -19114,7 +18718,7 @@
               <a:p>
                 <a:pPr algn="ctr"/>
                 <a:r>
-                  <a:rPr lang="en-US" sz="2399" b="1">
+                  <a:rPr lang="en-US" sz="2399" b="1" dirty="0">
                     <a:solidFill>
                       <a:srgbClr val="FFFFFF"/>
                     </a:solidFill>
@@ -19122,14 +18726,14 @@
                   <a:t>Height</a:t>
                 </a:r>
                 <a:r>
-                  <a:rPr lang="en-GB" sz="2399" b="1">
+                  <a:rPr lang="en-GB" sz="2399" b="1" dirty="0">
                     <a:solidFill>
                       <a:srgbClr val="FFFFFF"/>
                     </a:solidFill>
                   </a:rPr>
                   <a:t> = 0</a:t>
                 </a:r>
-                <a:endParaRPr lang="en-US" sz="2399" b="1">
+                <a:endParaRPr lang="en-US" sz="2399" b="1" dirty="0">
                   <a:solidFill>
                     <a:srgbClr val="FFFFFF"/>
                   </a:solidFill>
@@ -19179,7 +18783,7 @@
               <a:lstStyle/>
               <a:p>
                 <a:pPr algn="ctr"/>
-                <a:endParaRPr lang="en-US" sz="3599" b="1"/>
+                <a:endParaRPr lang="en-US" sz="3599" b="1" dirty="0"/>
               </a:p>
             </p:txBody>
           </p:sp>
@@ -19311,7 +18915,7 @@
               <a:pPr/>
               <a:t>5</a:t>
             </a:fld>
-            <a:endParaRPr lang="en-US"/>
+            <a:endParaRPr lang="en-US" dirty="0"/>
           </a:p>
         </p:txBody>
       </p:sp>
@@ -19732,10 +19336,10 @@
           <a:lstStyle/>
           <a:p>
             <a:r>
-              <a:rPr lang="bg-BG"/>
+              <a:rPr lang="bg-BG" dirty="0"/>
               <a:t>Множество конструктори</a:t>
             </a:r>
-            <a:endParaRPr lang="en-US"/>
+            <a:endParaRPr lang="en-US" dirty="0"/>
           </a:p>
         </p:txBody>
       </p:sp>
@@ -20043,23 +19647,7 @@
                   <a:schemeClr val="tx1"/>
                 </a:solidFill>
               </a:rPr>
-              <a:t>    </a:t>
-            </a:r>
-            <a:r>
-              <a:rPr lang="en-US" sz="2499" dirty="0" err="1">
-                <a:solidFill>
-                  <a:schemeClr val="tx1"/>
-                </a:solidFill>
-              </a:rPr>
-              <a:t>this.color</a:t>
-            </a:r>
-            <a:r>
-              <a:rPr lang="en-US" sz="2499" dirty="0">
-                <a:solidFill>
-                  <a:schemeClr val="tx1"/>
-                </a:solidFill>
-              </a:rPr>
-              <a:t> = "white";</a:t>
+              <a:t>    this.color = "white";</a:t>
             </a:r>
           </a:p>
           <a:p>
@@ -20213,23 +19801,7 @@
                   <a:schemeClr val="tx1"/>
                 </a:solidFill>
               </a:rPr>
-              <a:t>    </a:t>
-            </a:r>
-            <a:r>
-              <a:rPr lang="en-US" sz="2499" dirty="0" err="1">
-                <a:solidFill>
-                  <a:schemeClr val="tx1"/>
-                </a:solidFill>
-              </a:rPr>
-              <a:t>this.color</a:t>
-            </a:r>
-            <a:r>
-              <a:rPr lang="en-US" sz="2499" dirty="0">
-                <a:solidFill>
-                  <a:schemeClr val="tx1"/>
-                </a:solidFill>
-              </a:rPr>
-              <a:t> = color;</a:t>
+              <a:t>    this.color = color;</a:t>
             </a:r>
           </a:p>
           <a:p>
@@ -20538,7 +20110,7 @@
               <a:pPr/>
               <a:t>7</a:t>
             </a:fld>
-            <a:endParaRPr lang="en-US" noProof="0"/>
+            <a:endParaRPr lang="en-US" noProof="0" dirty="0"/>
           </a:p>
         </p:txBody>
       </p:sp>
@@ -20873,11 +20445,11 @@
           <a:lstStyle/>
           <a:p>
             <a:r>
-              <a:rPr lang="bg-BG"/>
+              <a:rPr lang="bg-BG" dirty="0"/>
               <a:t>Единият конструктор може да извика другия (</a:t>
             </a:r>
             <a:r>
-              <a:rPr lang="en-US" b="1">
+              <a:rPr lang="en-US" b="1" dirty="0">
                 <a:solidFill>
                   <a:schemeClr val="bg1"/>
                 </a:solidFill>
@@ -20885,10 +20457,10 @@
               <a:t>constructor chaining</a:t>
             </a:r>
             <a:r>
-              <a:rPr lang="en-US"/>
+              <a:rPr lang="en-US" dirty="0"/>
               <a:t>)</a:t>
             </a:r>
-            <a:endParaRPr lang="en-GB"/>
+            <a:endParaRPr lang="en-GB" dirty="0"/>
           </a:p>
         </p:txBody>
       </p:sp>
@@ -21052,7 +20624,7 @@
               </a:spcAft>
             </a:pPr>
             <a:r>
-              <a:rPr lang="en-US" sz="2499">
+              <a:rPr lang="en-US" sz="2499" dirty="0">
                 <a:solidFill>
                   <a:schemeClr val="tx1"/>
                 </a:solidFill>
@@ -21070,7 +20642,7 @@
               </a:spcAft>
             </a:pPr>
             <a:r>
-              <a:rPr lang="en-US" sz="2499">
+              <a:rPr lang="en-US" sz="2499" dirty="0">
                 <a:solidFill>
                   <a:schemeClr val="tx1"/>
                 </a:solidFill>
@@ -21088,7 +20660,7 @@
               </a:spcAft>
             </a:pPr>
             <a:r>
-              <a:rPr lang="en-US" sz="2499">
+              <a:rPr lang="en-US" sz="2499" dirty="0">
                 <a:solidFill>
                   <a:schemeClr val="tx1"/>
                 </a:solidFill>
@@ -21104,7 +20676,7 @@
               <a:t>int</a:t>
             </a:r>
             <a:r>
-              <a:rPr lang="en-US" sz="2499">
+              <a:rPr lang="en-US" sz="2499" dirty="0">
                 <a:solidFill>
                   <a:schemeClr val="tx1"/>
                 </a:solidFill>
@@ -21122,7 +20694,7 @@
               </a:spcAft>
             </a:pPr>
             <a:r>
-              <a:rPr lang="en-US" sz="2499">
+              <a:rPr lang="en-US" sz="2499" dirty="0">
                 <a:solidFill>
                   <a:schemeClr val="tx1"/>
                 </a:solidFill>
@@ -21130,7 +20702,7 @@
               <a:t>  public </a:t>
             </a:r>
             <a:r>
-              <a:rPr lang="en-US" sz="2499">
+              <a:rPr lang="en-US" sz="2499" dirty="0">
                 <a:solidFill>
                   <a:schemeClr val="bg1"/>
                 </a:solidFill>
@@ -21138,7 +20710,7 @@
               <a:t>Person()</a:t>
             </a:r>
             <a:r>
-              <a:rPr lang="en-US" sz="2499"/>
+              <a:rPr lang="en-US" sz="2499" dirty="0"/>
               <a:t> </a:t>
             </a:r>
           </a:p>
@@ -21152,7 +20724,7 @@
               </a:spcAft>
             </a:pPr>
             <a:r>
-              <a:rPr lang="en-US" sz="2499">
+              <a:rPr lang="en-US" sz="2499" dirty="0">
                 <a:solidFill>
                   <a:schemeClr val="tx1"/>
                 </a:solidFill>
@@ -21188,7 +20760,7 @@
               </a:spcAft>
             </a:pPr>
             <a:r>
-              <a:rPr lang="en-US" sz="2499">
+              <a:rPr lang="en-US" sz="2499" dirty="0">
                 <a:solidFill>
                   <a:schemeClr val="tx1"/>
                 </a:solidFill>
@@ -21206,7 +20778,7 @@
               </a:spcAft>
             </a:pPr>
             <a:r>
-              <a:rPr lang="en-US" sz="2499">
+              <a:rPr lang="en-US" sz="2499" dirty="0">
                 <a:solidFill>
                   <a:schemeClr val="tx1"/>
                 </a:solidFill>
@@ -21214,7 +20786,7 @@
               <a:t>  public Person(string name) : </a:t>
             </a:r>
             <a:r>
-              <a:rPr lang="en-US" sz="2499">
+              <a:rPr lang="en-US" sz="2499" dirty="0">
                 <a:solidFill>
                   <a:schemeClr val="bg1"/>
                 </a:solidFill>
@@ -21222,14 +20794,14 @@
               <a:t>this()</a:t>
             </a:r>
             <a:br>
-              <a:rPr lang="bg-BG" sz="2499">
+              <a:rPr lang="bg-BG" sz="2499" dirty="0">
                 <a:solidFill>
                   <a:schemeClr val="bg1"/>
                 </a:solidFill>
               </a:rPr>
             </a:br>
             <a:r>
-              <a:rPr lang="bg-BG" sz="2499">
+              <a:rPr lang="bg-BG" sz="2499" dirty="0">
                 <a:solidFill>
                   <a:schemeClr val="bg1"/>
                 </a:solidFill>
@@ -21237,7 +20809,7 @@
               <a:t>  </a:t>
             </a:r>
             <a:r>
-              <a:rPr lang="en-US" sz="2499">
+              <a:rPr lang="en-US" sz="2499" dirty="0">
                 <a:solidFill>
                   <a:schemeClr val="tx1"/>
                 </a:solidFill>
@@ -21255,7 +20827,7 @@
               </a:spcAft>
             </a:pPr>
             <a:r>
-              <a:rPr lang="en-US" sz="2499">
+              <a:rPr lang="en-US" sz="2499" dirty="0">
                 <a:solidFill>
                   <a:schemeClr val="tx1"/>
                 </a:solidFill>
@@ -21273,7 +20845,7 @@
               </a:spcAft>
             </a:pPr>
             <a:r>
-              <a:rPr lang="en-US" sz="2499">
+              <a:rPr lang="en-US" sz="2499" dirty="0">
                 <a:solidFill>
                   <a:schemeClr val="tx1"/>
                 </a:solidFill>
@@ -21291,7 +20863,7 @@
               </a:spcAft>
             </a:pPr>
             <a:r>
-              <a:rPr lang="en-US" sz="2499">
+              <a:rPr lang="en-US" sz="2499" dirty="0">
                 <a:solidFill>
                   <a:schemeClr val="tx1"/>
                 </a:solidFill>
@@ -21459,7 +21031,7 @@
           <a:lstStyle/>
           <a:p>
             <a:pPr algn="ctr"/>
-            <a:endParaRPr lang="en-US" sz="2799" b="1">
+            <a:endParaRPr lang="en-US" sz="2799" b="1" dirty="0">
               <a:solidFill>
                 <a:srgbClr val="FFFFFF"/>
               </a:solidFill>
@@ -21512,7 +21084,7 @@
               <a:pPr/>
               <a:t>8</a:t>
             </a:fld>
-            <a:endParaRPr lang="en-US" noProof="0"/>
+            <a:endParaRPr lang="en-US" noProof="0" dirty="0"/>
           </a:p>
         </p:txBody>
       </p:sp>
@@ -21543,10 +21115,10 @@
           <a:lstStyle/>
           <a:p>
             <a:r>
-              <a:rPr lang="bg-BG"/>
+              <a:rPr lang="bg-BG" dirty="0"/>
               <a:t>Множество конструктори</a:t>
             </a:r>
-            <a:endParaRPr lang="en-US"/>
+            <a:endParaRPr lang="en-US" dirty="0"/>
           </a:p>
         </p:txBody>
       </p:sp>
@@ -21969,18 +21541,18 @@
           <a:lstStyle/>
           <a:p>
             <a:r>
-              <a:rPr lang="bg-BG"/>
+              <a:rPr lang="bg-BG" dirty="0"/>
               <a:t>Как да използваме </a:t>
             </a:r>
             <a:r>
-              <a:rPr lang="en-US" b="1"/>
+              <a:rPr lang="en-US" b="1" dirty="0"/>
               <a:t>List&lt;T&gt;</a:t>
             </a:r>
             <a:r>
-              <a:rPr lang="bg-BG"/>
+              <a:rPr lang="bg-BG" dirty="0"/>
               <a:t>?</a:t>
             </a:r>
-            <a:endParaRPr lang="en-US"/>
+            <a:endParaRPr lang="en-US" dirty="0"/>
           </a:p>
         </p:txBody>
       </p:sp>
@@ -22006,10 +21578,10 @@
           <a:lstStyle/>
           <a:p>
             <a:r>
-              <a:rPr lang="bg-BG"/>
+              <a:rPr lang="bg-BG" dirty="0"/>
               <a:t>Списъци от обекти</a:t>
             </a:r>
-            <a:endParaRPr lang="en-US"/>
+            <a:endParaRPr lang="en-US" dirty="0"/>
           </a:p>
         </p:txBody>
       </p:sp>
@@ -22095,7 +21667,7 @@
             <a:p>
               <a:pPr algn="ctr"/>
               <a:r>
-                <a:rPr lang="en-GB" sz="2799" b="1">
+                <a:rPr lang="en-GB" sz="2799" b="1" dirty="0">
                   <a:solidFill>
                     <a:srgbClr val="FFFFFF"/>
                   </a:solidFill>
@@ -22109,7 +21681,7 @@
                 </a:rPr>
                 <a:t>…</a:t>
               </a:r>
-              <a:endParaRPr lang="en-US" sz="2799" b="1">
+              <a:endParaRPr lang="en-US" sz="2799" b="1" dirty="0">
                 <a:solidFill>
                   <a:srgbClr val="FFFFFF"/>
                 </a:solidFill>
@@ -22186,7 +21758,7 @@
             <a:p>
               <a:pPr algn="ctr"/>
               <a:r>
-                <a:rPr lang="en-GB" sz="2799" b="1">
+                <a:rPr lang="en-GB" sz="2799" b="1" dirty="0">
                   <a:solidFill>
                     <a:srgbClr val="FFFFFF"/>
                   </a:solidFill>
@@ -22200,7 +21772,7 @@
                 </a:rPr>
                 <a:t>…</a:t>
               </a:r>
-              <a:endParaRPr lang="en-US" sz="2799" b="1">
+              <a:endParaRPr lang="en-US" sz="2799" b="1" dirty="0">
                 <a:solidFill>
                   <a:srgbClr val="FFFFFF"/>
                 </a:solidFill>
@@ -22277,7 +21849,7 @@
             <a:p>
               <a:pPr algn="ctr"/>
               <a:r>
-                <a:rPr lang="en-GB" sz="2799" b="1">
+                <a:rPr lang="en-GB" sz="2799" b="1" dirty="0">
                   <a:solidFill>
                     <a:srgbClr val="FFFFFF"/>
                   </a:solidFill>
@@ -22291,7 +21863,7 @@
                 </a:rPr>
                 <a:t>…</a:t>
               </a:r>
-              <a:endParaRPr lang="en-US" sz="2799" b="1">
+              <a:endParaRPr lang="en-US" sz="2799" b="1" dirty="0">
                 <a:solidFill>
                   <a:srgbClr val="FFFFFF"/>
                 </a:solidFill>
@@ -22368,7 +21940,7 @@
             <a:p>
               <a:pPr algn="ctr"/>
               <a:r>
-                <a:rPr lang="en-GB" sz="2799" b="1">
+                <a:rPr lang="en-GB" sz="2799" b="1" dirty="0">
                   <a:solidFill>
                     <a:srgbClr val="FFFFFF"/>
                   </a:solidFill>
@@ -22382,7 +21954,7 @@
                 </a:rPr>
                 <a:t>…</a:t>
               </a:r>
-              <a:endParaRPr lang="en-US" sz="2799" b="1">
+              <a:endParaRPr lang="en-US" sz="2799" b="1" dirty="0">
                 <a:solidFill>
                   <a:srgbClr val="FFFFFF"/>
                 </a:solidFill>
@@ -22459,7 +22031,7 @@
             <a:p>
               <a:pPr algn="ctr"/>
               <a:r>
-                <a:rPr lang="en-GB" sz="2799" b="1">
+                <a:rPr lang="en-GB" sz="2799" b="1" dirty="0">
                   <a:solidFill>
                     <a:srgbClr val="FFFFFF"/>
                   </a:solidFill>
@@ -22473,7 +22045,7 @@
                 </a:rPr>
                 <a:t>…</a:t>
               </a:r>
-              <a:endParaRPr lang="en-US" sz="2799" b="1">
+              <a:endParaRPr lang="en-US" sz="2799" b="1" dirty="0">
                 <a:solidFill>
                   <a:srgbClr val="FFFFFF"/>
                 </a:solidFill>
@@ -22532,14 +22104,14 @@
                 <a:buSzPct val="70000"/>
               </a:pPr>
               <a:r>
-                <a:rPr lang="en-GB" sz="2999">
+                <a:rPr lang="en-GB" sz="2999" dirty="0">
                   <a:solidFill>
                     <a:schemeClr val="bg2"/>
                   </a:solidFill>
                 </a:rPr>
                 <a:t>0</a:t>
               </a:r>
-              <a:endParaRPr lang="en-US" sz="2999">
+              <a:endParaRPr lang="en-US" sz="2999" dirty="0">
                 <a:solidFill>
                   <a:schemeClr val="bg2"/>
                 </a:solidFill>
@@ -22591,14 +22163,14 @@
                 <a:buSzPct val="70000"/>
               </a:pPr>
               <a:r>
-                <a:rPr lang="en-GB" sz="2999">
+                <a:rPr lang="en-GB" sz="2999" dirty="0">
                   <a:solidFill>
                     <a:schemeClr val="bg2"/>
                   </a:solidFill>
                 </a:rPr>
                 <a:t>1</a:t>
               </a:r>
-              <a:endParaRPr lang="en-US" sz="2999">
+              <a:endParaRPr lang="en-US" sz="2999" dirty="0">
                 <a:solidFill>
                   <a:schemeClr val="bg2"/>
                 </a:solidFill>
@@ -22650,14 +22222,14 @@
                 <a:buSzPct val="70000"/>
               </a:pPr>
               <a:r>
-                <a:rPr lang="en-GB" sz="2999">
+                <a:rPr lang="en-GB" sz="2999" dirty="0">
                   <a:solidFill>
                     <a:schemeClr val="bg2"/>
                   </a:solidFill>
                 </a:rPr>
                 <a:t>2</a:t>
               </a:r>
-              <a:endParaRPr lang="en-US" sz="2999">
+              <a:endParaRPr lang="en-US" sz="2999" dirty="0">
                 <a:solidFill>
                   <a:schemeClr val="bg2"/>
                 </a:solidFill>
@@ -22709,14 +22281,14 @@
                 <a:buSzPct val="70000"/>
               </a:pPr>
               <a:r>
-                <a:rPr lang="en-GB" sz="2999">
+                <a:rPr lang="en-GB" sz="2999" dirty="0">
                   <a:solidFill>
                     <a:schemeClr val="bg2"/>
                   </a:solidFill>
                 </a:rPr>
                 <a:t>3</a:t>
               </a:r>
-              <a:endParaRPr lang="en-US" sz="2999">
+              <a:endParaRPr lang="en-US" sz="2999" dirty="0">
                 <a:solidFill>
                   <a:schemeClr val="bg2"/>
                 </a:solidFill>
@@ -22768,14 +22340,14 @@
                 <a:buSzPct val="70000"/>
               </a:pPr>
               <a:r>
-                <a:rPr lang="en-GB" sz="2999">
+                <a:rPr lang="en-GB" sz="2999" dirty="0">
                   <a:solidFill>
                     <a:schemeClr val="bg2"/>
                   </a:solidFill>
                 </a:rPr>
                 <a:t>4</a:t>
               </a:r>
-              <a:endParaRPr lang="en-US" sz="2999">
+              <a:endParaRPr lang="en-US" sz="2999" dirty="0">
                 <a:solidFill>
                   <a:schemeClr val="bg2"/>
                 </a:solidFill>

</xml_diff>